<commit_message>
added models to P3
</commit_message>
<xml_diff>
--- a/P3_future_OddBall_ToT.pptx
+++ b/P3_future_OddBall_ToT.pptx
@@ -5,10 +5,10 @@
     <p:sldMasterId id="2147483656" r:id="rId1"/>
   </p:sldMasterIdLst>
   <p:notesMasterIdLst>
-    <p:notesMasterId r:id="rId22"/>
+    <p:notesMasterId r:id="rId20"/>
   </p:notesMasterIdLst>
   <p:handoutMasterIdLst>
-    <p:handoutMasterId r:id="rId23"/>
+    <p:handoutMasterId r:id="rId21"/>
   </p:handoutMasterIdLst>
   <p:sldIdLst>
     <p:sldId id="1334" r:id="rId2"/>
@@ -17,20 +17,18 @@
     <p:sldId id="3400" r:id="rId5"/>
     <p:sldId id="3411" r:id="rId6"/>
     <p:sldId id="3401" r:id="rId7"/>
-    <p:sldId id="3410" r:id="rId8"/>
-    <p:sldId id="3402" r:id="rId9"/>
-    <p:sldId id="3403" r:id="rId10"/>
-    <p:sldId id="3404" r:id="rId11"/>
-    <p:sldId id="3405" r:id="rId12"/>
-    <p:sldId id="3406" r:id="rId13"/>
-    <p:sldId id="3407" r:id="rId14"/>
-    <p:sldId id="3408" r:id="rId15"/>
-    <p:sldId id="3409" r:id="rId16"/>
-    <p:sldId id="3397" r:id="rId17"/>
-    <p:sldId id="2577" r:id="rId18"/>
-    <p:sldId id="3343" r:id="rId19"/>
-    <p:sldId id="3344" r:id="rId20"/>
-    <p:sldId id="2994" r:id="rId21"/>
+    <p:sldId id="3415" r:id="rId8"/>
+    <p:sldId id="3410" r:id="rId9"/>
+    <p:sldId id="3402" r:id="rId10"/>
+    <p:sldId id="3403" r:id="rId11"/>
+    <p:sldId id="3404" r:id="rId12"/>
+    <p:sldId id="3405" r:id="rId13"/>
+    <p:sldId id="3406" r:id="rId14"/>
+    <p:sldId id="3407" r:id="rId15"/>
+    <p:sldId id="3416" r:id="rId16"/>
+    <p:sldId id="3408" r:id="rId17"/>
+    <p:sldId id="3414" r:id="rId18"/>
+    <p:sldId id="2994" r:id="rId19"/>
   </p:sldIdLst>
   <p:sldSz cx="9144000" cy="6858000" type="screen4x3"/>
   <p:notesSz cx="7315200" cy="9601200"/>
@@ -1340,7 +1338,7 @@
               <a:pPr>
                 <a:defRPr/>
               </a:pPr>
-              <a:t>17</a:t>
+              <a:t>7</a:t>
             </a:fld>
             <a:endParaRPr lang="en-US"/>
           </a:p>
@@ -1349,7 +1347,7 @@
     </p:spTree>
     <p:extLst>
       <p:ext uri="{BB962C8B-B14F-4D97-AF65-F5344CB8AC3E}">
-        <p14:creationId xmlns:p14="http://schemas.microsoft.com/office/powerpoint/2010/main" val="1157519960"/>
+        <p14:creationId xmlns:p14="http://schemas.microsoft.com/office/powerpoint/2010/main" val="687686332"/>
       </p:ext>
     </p:extLst>
   </p:cSld>
@@ -1455,7 +1453,122 @@
               <a:pPr>
                 <a:defRPr/>
               </a:pPr>
-              <a:t>20</a:t>
+              <a:t>15</a:t>
+            </a:fld>
+            <a:endParaRPr lang="en-US"/>
+          </a:p>
+        </p:txBody>
+      </p:sp>
+    </p:spTree>
+    <p:extLst>
+      <p:ext uri="{BB962C8B-B14F-4D97-AF65-F5344CB8AC3E}">
+        <p14:creationId xmlns:p14="http://schemas.microsoft.com/office/powerpoint/2010/main" val="3344630131"/>
+      </p:ext>
+    </p:extLst>
+  </p:cSld>
+  <p:clrMapOvr>
+    <a:masterClrMapping/>
+  </p:clrMapOvr>
+</p:notes>
+</file>
+
+<file path=ppt/notesSlides/notesSlide6.xml><?xml version="1.0" encoding="utf-8"?>
+<p:notes xmlns:a="http://schemas.openxmlformats.org/drawingml/2006/main" xmlns:r="http://schemas.openxmlformats.org/officeDocument/2006/relationships" xmlns:p="http://schemas.openxmlformats.org/presentationml/2006/main">
+  <p:cSld>
+    <p:spTree>
+      <p:nvGrpSpPr>
+        <p:cNvPr id="1" name=""/>
+        <p:cNvGrpSpPr/>
+        <p:nvPr/>
+      </p:nvGrpSpPr>
+      <p:grpSpPr>
+        <a:xfrm>
+          <a:off x="0" y="0"/>
+          <a:ext cx="0" cy="0"/>
+          <a:chOff x="0" y="0"/>
+          <a:chExt cx="0" cy="0"/>
+        </a:xfrm>
+      </p:grpSpPr>
+      <p:sp>
+        <p:nvSpPr>
+          <p:cNvPr id="2" name="Slide Image Placeholder 1"/>
+          <p:cNvSpPr>
+            <a:spLocks noGrp="1" noRot="1" noChangeAspect="1"/>
+          </p:cNvSpPr>
+          <p:nvPr>
+            <p:ph type="sldImg"/>
+          </p:nvPr>
+        </p:nvSpPr>
+        <p:spPr/>
+      </p:sp>
+      <p:sp>
+        <p:nvSpPr>
+          <p:cNvPr id="3" name="Notes Placeholder 2"/>
+          <p:cNvSpPr>
+            <a:spLocks noGrp="1"/>
+          </p:cNvSpPr>
+          <p:nvPr>
+            <p:ph type="body" idx="1"/>
+          </p:nvPr>
+        </p:nvSpPr>
+        <p:spPr/>
+        <p:txBody>
+          <a:bodyPr/>
+          <a:lstStyle/>
+          <a:p>
+            <a:endParaRPr lang="en-US"/>
+          </a:p>
+        </p:txBody>
+      </p:sp>
+      <p:sp>
+        <p:nvSpPr>
+          <p:cNvPr id="4" name="Header Placeholder 3"/>
+          <p:cNvSpPr>
+            <a:spLocks noGrp="1"/>
+          </p:cNvSpPr>
+          <p:nvPr>
+            <p:ph type="hdr" sz="quarter" idx="10"/>
+          </p:nvPr>
+        </p:nvSpPr>
+        <p:spPr/>
+        <p:txBody>
+          <a:bodyPr/>
+          <a:lstStyle/>
+          <a:p>
+            <a:pPr>
+              <a:defRPr/>
+            </a:pPr>
+            <a:r>
+              <a:rPr lang="en-US"/>
+              <a:t>Faloutsos</a:t>
+            </a:r>
+          </a:p>
+        </p:txBody>
+      </p:sp>
+      <p:sp>
+        <p:nvSpPr>
+          <p:cNvPr id="5" name="Slide Number Placeholder 4"/>
+          <p:cNvSpPr>
+            <a:spLocks noGrp="1"/>
+          </p:cNvSpPr>
+          <p:nvPr>
+            <p:ph type="sldNum" sz="quarter" idx="11"/>
+          </p:nvPr>
+        </p:nvSpPr>
+        <p:spPr/>
+        <p:txBody>
+          <a:bodyPr/>
+          <a:lstStyle/>
+          <a:p>
+            <a:pPr>
+              <a:defRPr/>
+            </a:pPr>
+            <a:fld id="{D7FAE81C-20DD-D146-AEB1-DC28910AACE1}" type="slidenum">
+              <a:rPr lang="en-US" smtClean="0"/>
+              <a:pPr>
+                <a:defRPr/>
+              </a:pPr>
+              <a:t>18</a:t>
             </a:fld>
             <a:endParaRPr lang="en-US"/>
           </a:p>
@@ -7327,7 +7440,7 @@
           <p:cNvPr id="2" name="Title 1">
             <a:extLst>
               <a:ext uri="{FF2B5EF4-FFF2-40B4-BE49-F238E27FC236}">
-                <a16:creationId xmlns:a16="http://schemas.microsoft.com/office/drawing/2014/main" id="{E2149C67-550A-4144-9A30-035578B52DD8}"/>
+                <a16:creationId xmlns:a16="http://schemas.microsoft.com/office/drawing/2014/main" id="{5D7DDBE1-1E7A-E24F-AB5E-8960C93510EE}"/>
               </a:ext>
             </a:extLst>
           </p:cNvPr>
@@ -7349,10 +7462,10 @@
       </p:sp>
       <p:pic>
         <p:nvPicPr>
-          <p:cNvPr id="8" name="Content Placeholder 7" descr="Graphical user interface&#10;&#10;Description automatically generated with medium confidence">
+          <p:cNvPr id="8" name="Content Placeholder 7" descr="Graphical user interface, application&#10;&#10;Description automatically generated">
             <a:extLst>
               <a:ext uri="{FF2B5EF4-FFF2-40B4-BE49-F238E27FC236}">
-                <a16:creationId xmlns:a16="http://schemas.microsoft.com/office/drawing/2014/main" id="{11ADE989-89D5-4541-8C3A-B6AFED55138D}"/>
+                <a16:creationId xmlns:a16="http://schemas.microsoft.com/office/drawing/2014/main" id="{2868651C-064D-CE40-A67A-52A8E24D28E9}"/>
               </a:ext>
             </a:extLst>
           </p:cNvPr>
@@ -7371,8 +7484,8 @@
         </p:blipFill>
         <p:spPr>
           <a:xfrm>
-            <a:off x="717550" y="2527300"/>
-            <a:ext cx="7708900" cy="2489200"/>
+            <a:off x="792392" y="2364828"/>
+            <a:ext cx="8230957" cy="2376433"/>
           </a:xfrm>
         </p:spPr>
       </p:pic>
@@ -7381,7 +7494,7 @@
           <p:cNvPr id="4" name="Date Placeholder 3">
             <a:extLst>
               <a:ext uri="{FF2B5EF4-FFF2-40B4-BE49-F238E27FC236}">
-                <a16:creationId xmlns:a16="http://schemas.microsoft.com/office/drawing/2014/main" id="{A3F63495-E49F-DB4F-AADE-A964D43E4571}"/>
+                <a16:creationId xmlns:a16="http://schemas.microsoft.com/office/drawing/2014/main" id="{466486AD-A7A7-6241-8809-8974D84F31D2}"/>
               </a:ext>
             </a:extLst>
           </p:cNvPr>
@@ -7412,7 +7525,7 @@
           <p:cNvPr id="5" name="Footer Placeholder 4">
             <a:extLst>
               <a:ext uri="{FF2B5EF4-FFF2-40B4-BE49-F238E27FC236}">
-                <a16:creationId xmlns:a16="http://schemas.microsoft.com/office/drawing/2014/main" id="{758A5FF7-7C3E-AF4B-9779-2F800BB2EE35}"/>
+                <a16:creationId xmlns:a16="http://schemas.microsoft.com/office/drawing/2014/main" id="{F398E5F7-3D25-CD47-80BD-A864D9A73436}"/>
               </a:ext>
             </a:extLst>
           </p:cNvPr>
@@ -7444,7 +7557,7 @@
           <p:cNvPr id="6" name="Slide Number Placeholder 5">
             <a:extLst>
               <a:ext uri="{FF2B5EF4-FFF2-40B4-BE49-F238E27FC236}">
-                <a16:creationId xmlns:a16="http://schemas.microsoft.com/office/drawing/2014/main" id="{6C0EDE0D-8938-074C-8031-72E7C2277367}"/>
+                <a16:creationId xmlns:a16="http://schemas.microsoft.com/office/drawing/2014/main" id="{64514D71-7FD5-3F4D-AB73-1E2A43CF4716}"/>
               </a:ext>
             </a:extLst>
           </p:cNvPr>
@@ -7477,7 +7590,7 @@
     </p:spTree>
     <p:extLst>
       <p:ext uri="{BB962C8B-B14F-4D97-AF65-F5344CB8AC3E}">
-        <p14:creationId xmlns:p14="http://schemas.microsoft.com/office/powerpoint/2010/main" val="1545109968"/>
+        <p14:creationId xmlns:p14="http://schemas.microsoft.com/office/powerpoint/2010/main" val="743589915"/>
       </p:ext>
     </p:extLst>
   </p:cSld>
@@ -7510,7 +7623,7 @@
           <p:cNvPr id="2" name="Title 1">
             <a:extLst>
               <a:ext uri="{FF2B5EF4-FFF2-40B4-BE49-F238E27FC236}">
-                <a16:creationId xmlns:a16="http://schemas.microsoft.com/office/drawing/2014/main" id="{EA1728A7-C5CE-8A42-BCD5-0A579261496C}"/>
+                <a16:creationId xmlns:a16="http://schemas.microsoft.com/office/drawing/2014/main" id="{E2149C67-550A-4144-9A30-035578B52DD8}"/>
               </a:ext>
             </a:extLst>
           </p:cNvPr>
@@ -7532,10 +7645,10 @@
       </p:sp>
       <p:pic>
         <p:nvPicPr>
-          <p:cNvPr id="8" name="Content Placeholder 7" descr="Text&#10;&#10;Description automatically generated">
+          <p:cNvPr id="8" name="Content Placeholder 7" descr="Graphical user interface&#10;&#10;Description automatically generated with medium confidence">
             <a:extLst>
               <a:ext uri="{FF2B5EF4-FFF2-40B4-BE49-F238E27FC236}">
-                <a16:creationId xmlns:a16="http://schemas.microsoft.com/office/drawing/2014/main" id="{F6BDE426-DAC0-9E4E-A229-CB116BC1CF74}"/>
+                <a16:creationId xmlns:a16="http://schemas.microsoft.com/office/drawing/2014/main" id="{11ADE989-89D5-4541-8C3A-B6AFED55138D}"/>
               </a:ext>
             </a:extLst>
           </p:cNvPr>
@@ -7554,8 +7667,8 @@
         </p:blipFill>
         <p:spPr>
           <a:xfrm>
-            <a:off x="825500" y="2451100"/>
-            <a:ext cx="7493000" cy="2641600"/>
+            <a:off x="252786" y="2280744"/>
+            <a:ext cx="8342267" cy="2693714"/>
           </a:xfrm>
         </p:spPr>
       </p:pic>
@@ -7564,7 +7677,7 @@
           <p:cNvPr id="4" name="Date Placeholder 3">
             <a:extLst>
               <a:ext uri="{FF2B5EF4-FFF2-40B4-BE49-F238E27FC236}">
-                <a16:creationId xmlns:a16="http://schemas.microsoft.com/office/drawing/2014/main" id="{B279E37B-4B32-EB48-9557-DA84FDF97AB9}"/>
+                <a16:creationId xmlns:a16="http://schemas.microsoft.com/office/drawing/2014/main" id="{A3F63495-E49F-DB4F-AADE-A964D43E4571}"/>
               </a:ext>
             </a:extLst>
           </p:cNvPr>
@@ -7595,7 +7708,7 @@
           <p:cNvPr id="5" name="Footer Placeholder 4">
             <a:extLst>
               <a:ext uri="{FF2B5EF4-FFF2-40B4-BE49-F238E27FC236}">
-                <a16:creationId xmlns:a16="http://schemas.microsoft.com/office/drawing/2014/main" id="{E2C3D51B-5605-9448-B380-F7059D51C048}"/>
+                <a16:creationId xmlns:a16="http://schemas.microsoft.com/office/drawing/2014/main" id="{758A5FF7-7C3E-AF4B-9779-2F800BB2EE35}"/>
               </a:ext>
             </a:extLst>
           </p:cNvPr>
@@ -7627,7 +7740,7 @@
           <p:cNvPr id="6" name="Slide Number Placeholder 5">
             <a:extLst>
               <a:ext uri="{FF2B5EF4-FFF2-40B4-BE49-F238E27FC236}">
-                <a16:creationId xmlns:a16="http://schemas.microsoft.com/office/drawing/2014/main" id="{57A5578B-AD69-5C4C-9B9C-6703CD532736}"/>
+                <a16:creationId xmlns:a16="http://schemas.microsoft.com/office/drawing/2014/main" id="{6C0EDE0D-8938-074C-8031-72E7C2277367}"/>
               </a:ext>
             </a:extLst>
           </p:cNvPr>
@@ -7660,7 +7773,7 @@
     </p:spTree>
     <p:extLst>
       <p:ext uri="{BB962C8B-B14F-4D97-AF65-F5344CB8AC3E}">
-        <p14:creationId xmlns:p14="http://schemas.microsoft.com/office/powerpoint/2010/main" val="4151371070"/>
+        <p14:creationId xmlns:p14="http://schemas.microsoft.com/office/powerpoint/2010/main" val="1545109968"/>
       </p:ext>
     </p:extLst>
   </p:cSld>
@@ -7693,7 +7806,7 @@
           <p:cNvPr id="2" name="Title 1">
             <a:extLst>
               <a:ext uri="{FF2B5EF4-FFF2-40B4-BE49-F238E27FC236}">
-                <a16:creationId xmlns:a16="http://schemas.microsoft.com/office/drawing/2014/main" id="{8C587667-F75D-1E40-86CC-AE2C938F49C7}"/>
+                <a16:creationId xmlns:a16="http://schemas.microsoft.com/office/drawing/2014/main" id="{EA1728A7-C5CE-8A42-BCD5-0A579261496C}"/>
               </a:ext>
             </a:extLst>
           </p:cNvPr>
@@ -7715,10 +7828,10 @@
       </p:sp>
       <p:pic>
         <p:nvPicPr>
-          <p:cNvPr id="8" name="Content Placeholder 7" descr="A picture containing text, person&#10;&#10;Description automatically generated">
+          <p:cNvPr id="8" name="Content Placeholder 7" descr="Text&#10;&#10;Description automatically generated">
             <a:extLst>
               <a:ext uri="{FF2B5EF4-FFF2-40B4-BE49-F238E27FC236}">
-                <a16:creationId xmlns:a16="http://schemas.microsoft.com/office/drawing/2014/main" id="{3DCDC92E-011F-6743-89C5-E3EE64CB4501}"/>
+                <a16:creationId xmlns:a16="http://schemas.microsoft.com/office/drawing/2014/main" id="{F6BDE426-DAC0-9E4E-A229-CB116BC1CF74}"/>
               </a:ext>
             </a:extLst>
           </p:cNvPr>
@@ -7737,8 +7850,8 @@
         </p:blipFill>
         <p:spPr>
           <a:xfrm>
-            <a:off x="825500" y="2343150"/>
-            <a:ext cx="7493000" cy="2857500"/>
+            <a:off x="825500" y="2451100"/>
+            <a:ext cx="7493000" cy="2641600"/>
           </a:xfrm>
         </p:spPr>
       </p:pic>
@@ -7747,7 +7860,7 @@
           <p:cNvPr id="4" name="Date Placeholder 3">
             <a:extLst>
               <a:ext uri="{FF2B5EF4-FFF2-40B4-BE49-F238E27FC236}">
-                <a16:creationId xmlns:a16="http://schemas.microsoft.com/office/drawing/2014/main" id="{1AF763B3-B5F8-7049-9DA4-50D17E402FFB}"/>
+                <a16:creationId xmlns:a16="http://schemas.microsoft.com/office/drawing/2014/main" id="{B279E37B-4B32-EB48-9557-DA84FDF97AB9}"/>
               </a:ext>
             </a:extLst>
           </p:cNvPr>
@@ -7778,7 +7891,7 @@
           <p:cNvPr id="5" name="Footer Placeholder 4">
             <a:extLst>
               <a:ext uri="{FF2B5EF4-FFF2-40B4-BE49-F238E27FC236}">
-                <a16:creationId xmlns:a16="http://schemas.microsoft.com/office/drawing/2014/main" id="{6F156DB5-207F-084E-BB6E-1BD8A5E0EF31}"/>
+                <a16:creationId xmlns:a16="http://schemas.microsoft.com/office/drawing/2014/main" id="{E2C3D51B-5605-9448-B380-F7059D51C048}"/>
               </a:ext>
             </a:extLst>
           </p:cNvPr>
@@ -7810,7 +7923,7 @@
           <p:cNvPr id="6" name="Slide Number Placeholder 5">
             <a:extLst>
               <a:ext uri="{FF2B5EF4-FFF2-40B4-BE49-F238E27FC236}">
-                <a16:creationId xmlns:a16="http://schemas.microsoft.com/office/drawing/2014/main" id="{665D87A8-733D-CB43-94B4-D8CD64E72BE7}"/>
+                <a16:creationId xmlns:a16="http://schemas.microsoft.com/office/drawing/2014/main" id="{57A5578B-AD69-5C4C-9B9C-6703CD532736}"/>
               </a:ext>
             </a:extLst>
           </p:cNvPr>
@@ -7843,7 +7956,7 @@
     </p:spTree>
     <p:extLst>
       <p:ext uri="{BB962C8B-B14F-4D97-AF65-F5344CB8AC3E}">
-        <p14:creationId xmlns:p14="http://schemas.microsoft.com/office/powerpoint/2010/main" val="2609801144"/>
+        <p14:creationId xmlns:p14="http://schemas.microsoft.com/office/powerpoint/2010/main" val="4151371070"/>
       </p:ext>
     </p:extLst>
   </p:cSld>
@@ -7876,7 +7989,7 @@
           <p:cNvPr id="2" name="Title 1">
             <a:extLst>
               <a:ext uri="{FF2B5EF4-FFF2-40B4-BE49-F238E27FC236}">
-                <a16:creationId xmlns:a16="http://schemas.microsoft.com/office/drawing/2014/main" id="{5DEF2526-8074-8844-AFFA-D0A999AC4CE6}"/>
+                <a16:creationId xmlns:a16="http://schemas.microsoft.com/office/drawing/2014/main" id="{8C587667-F75D-1E40-86CC-AE2C938F49C7}"/>
               </a:ext>
             </a:extLst>
           </p:cNvPr>
@@ -7898,10 +8011,10 @@
       </p:sp>
       <p:pic>
         <p:nvPicPr>
-          <p:cNvPr id="8" name="Content Placeholder 7" descr="Text&#10;&#10;Description automatically generated">
+          <p:cNvPr id="8" name="Content Placeholder 7" descr="A picture containing text, person&#10;&#10;Description automatically generated">
             <a:extLst>
               <a:ext uri="{FF2B5EF4-FFF2-40B4-BE49-F238E27FC236}">
-                <a16:creationId xmlns:a16="http://schemas.microsoft.com/office/drawing/2014/main" id="{4ABD0D0A-D125-6A4C-9BA9-CF9C5872F9BD}"/>
+                <a16:creationId xmlns:a16="http://schemas.microsoft.com/office/drawing/2014/main" id="{3DCDC92E-011F-6743-89C5-E3EE64CB4501}"/>
               </a:ext>
             </a:extLst>
           </p:cNvPr>
@@ -7920,8 +8033,8 @@
         </p:blipFill>
         <p:spPr>
           <a:xfrm>
-            <a:off x="1688219" y="1447800"/>
-            <a:ext cx="5767562" cy="4648200"/>
+            <a:off x="825500" y="2343150"/>
+            <a:ext cx="7493000" cy="2857500"/>
           </a:xfrm>
         </p:spPr>
       </p:pic>
@@ -7930,7 +8043,7 @@
           <p:cNvPr id="4" name="Date Placeholder 3">
             <a:extLst>
               <a:ext uri="{FF2B5EF4-FFF2-40B4-BE49-F238E27FC236}">
-                <a16:creationId xmlns:a16="http://schemas.microsoft.com/office/drawing/2014/main" id="{B7E89EC7-29F3-9A44-AED1-5B7D4C936388}"/>
+                <a16:creationId xmlns:a16="http://schemas.microsoft.com/office/drawing/2014/main" id="{1AF763B3-B5F8-7049-9DA4-50D17E402FFB}"/>
               </a:ext>
             </a:extLst>
           </p:cNvPr>
@@ -7961,7 +8074,7 @@
           <p:cNvPr id="5" name="Footer Placeholder 4">
             <a:extLst>
               <a:ext uri="{FF2B5EF4-FFF2-40B4-BE49-F238E27FC236}">
-                <a16:creationId xmlns:a16="http://schemas.microsoft.com/office/drawing/2014/main" id="{B08AEEC2-7764-9E4B-B723-D77E803105EE}"/>
+                <a16:creationId xmlns:a16="http://schemas.microsoft.com/office/drawing/2014/main" id="{6F156DB5-207F-084E-BB6E-1BD8A5E0EF31}"/>
               </a:ext>
             </a:extLst>
           </p:cNvPr>
@@ -7993,7 +8106,7 @@
           <p:cNvPr id="6" name="Slide Number Placeholder 5">
             <a:extLst>
               <a:ext uri="{FF2B5EF4-FFF2-40B4-BE49-F238E27FC236}">
-                <a16:creationId xmlns:a16="http://schemas.microsoft.com/office/drawing/2014/main" id="{AAEE4CE4-C844-B749-ACDE-555B0A870700}"/>
+                <a16:creationId xmlns:a16="http://schemas.microsoft.com/office/drawing/2014/main" id="{665D87A8-733D-CB43-94B4-D8CD64E72BE7}"/>
               </a:ext>
             </a:extLst>
           </p:cNvPr>
@@ -8026,7 +8139,7 @@
     </p:spTree>
     <p:extLst>
       <p:ext uri="{BB962C8B-B14F-4D97-AF65-F5344CB8AC3E}">
-        <p14:creationId xmlns:p14="http://schemas.microsoft.com/office/powerpoint/2010/main" val="198717125"/>
+        <p14:creationId xmlns:p14="http://schemas.microsoft.com/office/powerpoint/2010/main" val="2609801144"/>
       </p:ext>
     </p:extLst>
   </p:cSld>
@@ -8059,7 +8172,7 @@
           <p:cNvPr id="2" name="Title 1">
             <a:extLst>
               <a:ext uri="{FF2B5EF4-FFF2-40B4-BE49-F238E27FC236}">
-                <a16:creationId xmlns:a16="http://schemas.microsoft.com/office/drawing/2014/main" id="{4FFF780A-4AC0-E947-9E60-C651A93EFC53}"/>
+                <a16:creationId xmlns:a16="http://schemas.microsoft.com/office/drawing/2014/main" id="{5DEF2526-8074-8844-AFFA-D0A999AC4CE6}"/>
               </a:ext>
             </a:extLst>
           </p:cNvPr>
@@ -8084,7 +8197,7 @@
           <p:cNvPr id="8" name="Content Placeholder 7" descr="Text&#10;&#10;Description automatically generated">
             <a:extLst>
               <a:ext uri="{FF2B5EF4-FFF2-40B4-BE49-F238E27FC236}">
-                <a16:creationId xmlns:a16="http://schemas.microsoft.com/office/drawing/2014/main" id="{EA46362B-79B6-BC45-B817-6D187BCD94BC}"/>
+                <a16:creationId xmlns:a16="http://schemas.microsoft.com/office/drawing/2014/main" id="{4ABD0D0A-D125-6A4C-9BA9-CF9C5872F9BD}"/>
               </a:ext>
             </a:extLst>
           </p:cNvPr>
@@ -8103,8 +8216,8 @@
         </p:blipFill>
         <p:spPr>
           <a:xfrm>
-            <a:off x="685800" y="1920168"/>
-            <a:ext cx="7772400" cy="3703463"/>
+            <a:off x="1688219" y="1447800"/>
+            <a:ext cx="5767562" cy="4648200"/>
           </a:xfrm>
         </p:spPr>
       </p:pic>
@@ -8113,7 +8226,7 @@
           <p:cNvPr id="4" name="Date Placeholder 3">
             <a:extLst>
               <a:ext uri="{FF2B5EF4-FFF2-40B4-BE49-F238E27FC236}">
-                <a16:creationId xmlns:a16="http://schemas.microsoft.com/office/drawing/2014/main" id="{184406FC-1EBE-C643-896C-C61F4BA7160A}"/>
+                <a16:creationId xmlns:a16="http://schemas.microsoft.com/office/drawing/2014/main" id="{B7E89EC7-29F3-9A44-AED1-5B7D4C936388}"/>
               </a:ext>
             </a:extLst>
           </p:cNvPr>
@@ -8144,7 +8257,7 @@
           <p:cNvPr id="5" name="Footer Placeholder 4">
             <a:extLst>
               <a:ext uri="{FF2B5EF4-FFF2-40B4-BE49-F238E27FC236}">
-                <a16:creationId xmlns:a16="http://schemas.microsoft.com/office/drawing/2014/main" id="{858F08FC-69BA-A044-B568-2D5259DB1102}"/>
+                <a16:creationId xmlns:a16="http://schemas.microsoft.com/office/drawing/2014/main" id="{B08AEEC2-7764-9E4B-B723-D77E803105EE}"/>
               </a:ext>
             </a:extLst>
           </p:cNvPr>
@@ -8176,7 +8289,7 @@
           <p:cNvPr id="6" name="Slide Number Placeholder 5">
             <a:extLst>
               <a:ext uri="{FF2B5EF4-FFF2-40B4-BE49-F238E27FC236}">
-                <a16:creationId xmlns:a16="http://schemas.microsoft.com/office/drawing/2014/main" id="{B0A39F98-FAD7-F443-84E7-BAD1EDADA6C8}"/>
+                <a16:creationId xmlns:a16="http://schemas.microsoft.com/office/drawing/2014/main" id="{AAEE4CE4-C844-B749-ACDE-555B0A870700}"/>
               </a:ext>
             </a:extLst>
           </p:cNvPr>
@@ -8209,7 +8322,7 @@
     </p:spTree>
     <p:extLst>
       <p:ext uri="{BB962C8B-B14F-4D97-AF65-F5344CB8AC3E}">
-        <p14:creationId xmlns:p14="http://schemas.microsoft.com/office/powerpoint/2010/main" val="3459234371"/>
+        <p14:creationId xmlns:p14="http://schemas.microsoft.com/office/powerpoint/2010/main" val="198717125"/>
       </p:ext>
     </p:extLst>
   </p:cSld>
@@ -8239,372 +8352,6 @@
       </p:grpSpPr>
       <p:sp>
         <p:nvSpPr>
-          <p:cNvPr id="2" name="Title 1">
-            <a:extLst>
-              <a:ext uri="{FF2B5EF4-FFF2-40B4-BE49-F238E27FC236}">
-                <a16:creationId xmlns:a16="http://schemas.microsoft.com/office/drawing/2014/main" id="{25A51FB6-B358-5C41-8F7C-08F590AA4415}"/>
-              </a:ext>
-            </a:extLst>
-          </p:cNvPr>
-          <p:cNvSpPr>
-            <a:spLocks noGrp="1"/>
-          </p:cNvSpPr>
-          <p:nvPr>
-            <p:ph type="title"/>
-          </p:nvPr>
-        </p:nvSpPr>
-        <p:spPr/>
-        <p:txBody>
-          <a:bodyPr/>
-          <a:lstStyle/>
-          <a:p>
-            <a:endParaRPr lang="en-US"/>
-          </a:p>
-        </p:txBody>
-      </p:sp>
-      <p:pic>
-        <p:nvPicPr>
-          <p:cNvPr id="8" name="Content Placeholder 7" descr="Text&#10;&#10;Description automatically generated">
-            <a:extLst>
-              <a:ext uri="{FF2B5EF4-FFF2-40B4-BE49-F238E27FC236}">
-                <a16:creationId xmlns:a16="http://schemas.microsoft.com/office/drawing/2014/main" id="{97E76F1E-F1C7-1B41-861B-A85B9ABC17DE}"/>
-              </a:ext>
-            </a:extLst>
-          </p:cNvPr>
-          <p:cNvPicPr>
-            <a:picLocks noGrp="1" noChangeAspect="1"/>
-          </p:cNvPicPr>
-          <p:nvPr>
-            <p:ph idx="1"/>
-          </p:nvPr>
-        </p:nvPicPr>
-        <p:blipFill>
-          <a:blip r:embed="rId2"/>
-          <a:stretch>
-            <a:fillRect/>
-          </a:stretch>
-        </p:blipFill>
-        <p:spPr>
-          <a:xfrm>
-            <a:off x="825500" y="2749550"/>
-            <a:ext cx="7493000" cy="2044700"/>
-          </a:xfrm>
-        </p:spPr>
-      </p:pic>
-      <p:sp>
-        <p:nvSpPr>
-          <p:cNvPr id="4" name="Date Placeholder 3">
-            <a:extLst>
-              <a:ext uri="{FF2B5EF4-FFF2-40B4-BE49-F238E27FC236}">
-                <a16:creationId xmlns:a16="http://schemas.microsoft.com/office/drawing/2014/main" id="{57F24B75-C8BA-7147-968C-4A95653678FD}"/>
-              </a:ext>
-            </a:extLst>
-          </p:cNvPr>
-          <p:cNvSpPr>
-            <a:spLocks noGrp="1"/>
-          </p:cNvSpPr>
-          <p:nvPr>
-            <p:ph type="dt" sz="half" idx="10"/>
-          </p:nvPr>
-        </p:nvSpPr>
-        <p:spPr/>
-        <p:txBody>
-          <a:bodyPr/>
-          <a:lstStyle/>
-          <a:p>
-            <a:pPr>
-              <a:defRPr/>
-            </a:pPr>
-            <a:r>
-              <a:rPr lang="en-US"/>
-              <a:t>PAKDD 2021</a:t>
-            </a:r>
-          </a:p>
-        </p:txBody>
-      </p:sp>
-      <p:sp>
-        <p:nvSpPr>
-          <p:cNvPr id="5" name="Footer Placeholder 4">
-            <a:extLst>
-              <a:ext uri="{FF2B5EF4-FFF2-40B4-BE49-F238E27FC236}">
-                <a16:creationId xmlns:a16="http://schemas.microsoft.com/office/drawing/2014/main" id="{DC80738B-7A1F-5242-A96D-9B825C2C4DFA}"/>
-              </a:ext>
-            </a:extLst>
-          </p:cNvPr>
-          <p:cNvSpPr>
-            <a:spLocks noGrp="1"/>
-          </p:cNvSpPr>
-          <p:nvPr>
-            <p:ph type="ftr" sz="quarter" idx="11"/>
-          </p:nvPr>
-        </p:nvSpPr>
-        <p:spPr/>
-        <p:txBody>
-          <a:bodyPr/>
-          <a:lstStyle/>
-          <a:p>
-            <a:pPr>
-              <a:defRPr/>
-            </a:pPr>
-            <a:r>
-              <a:rPr lang="fi-FI"/>
-              <a:t>L. Akoglu, M. McGlohon, C. Faloutsos</a:t>
-            </a:r>
-            <a:endParaRPr lang="en-US"/>
-          </a:p>
-        </p:txBody>
-      </p:sp>
-      <p:sp>
-        <p:nvSpPr>
-          <p:cNvPr id="6" name="Slide Number Placeholder 5">
-            <a:extLst>
-              <a:ext uri="{FF2B5EF4-FFF2-40B4-BE49-F238E27FC236}">
-                <a16:creationId xmlns:a16="http://schemas.microsoft.com/office/drawing/2014/main" id="{5596DFF8-CB65-2646-88C2-B83DB247E07D}"/>
-              </a:ext>
-            </a:extLst>
-          </p:cNvPr>
-          <p:cNvSpPr>
-            <a:spLocks noGrp="1"/>
-          </p:cNvSpPr>
-          <p:nvPr>
-            <p:ph type="sldNum" sz="quarter" idx="12"/>
-          </p:nvPr>
-        </p:nvSpPr>
-        <p:spPr/>
-        <p:txBody>
-          <a:bodyPr/>
-          <a:lstStyle/>
-          <a:p>
-            <a:pPr>
-              <a:defRPr/>
-            </a:pPr>
-            <a:fld id="{F9B43987-7F84-BB4A-8611-CDF75B6A737D}" type="slidenum">
-              <a:rPr lang="en-US" smtClean="0"/>
-              <a:pPr>
-                <a:defRPr/>
-              </a:pPr>
-              <a:t>15</a:t>
-            </a:fld>
-            <a:endParaRPr lang="en-US"/>
-          </a:p>
-        </p:txBody>
-      </p:sp>
-    </p:spTree>
-    <p:extLst>
-      <p:ext uri="{BB962C8B-B14F-4D97-AF65-F5344CB8AC3E}">
-        <p14:creationId xmlns:p14="http://schemas.microsoft.com/office/powerpoint/2010/main" val="4020253643"/>
-      </p:ext>
-    </p:extLst>
-  </p:cSld>
-  <p:clrMapOvr>
-    <a:masterClrMapping/>
-  </p:clrMapOvr>
-  <p:transition/>
-</p:sld>
-</file>
-
-<file path=ppt/slides/slide16.xml><?xml version="1.0" encoding="utf-8"?>
-<p:sld xmlns:a="http://schemas.openxmlformats.org/drawingml/2006/main" xmlns:r="http://schemas.openxmlformats.org/officeDocument/2006/relationships" xmlns:p="http://schemas.openxmlformats.org/presentationml/2006/main">
-  <p:cSld>
-    <p:spTree>
-      <p:nvGrpSpPr>
-        <p:cNvPr id="1" name=""/>
-        <p:cNvGrpSpPr/>
-        <p:nvPr/>
-      </p:nvGrpSpPr>
-      <p:grpSpPr>
-        <a:xfrm>
-          <a:off x="0" y="0"/>
-          <a:ext cx="0" cy="0"/>
-          <a:chOff x="0" y="0"/>
-          <a:chExt cx="0" cy="0"/>
-        </a:xfrm>
-      </p:grpSpPr>
-      <p:sp>
-        <p:nvSpPr>
-          <p:cNvPr id="2" name="Title 1">
-            <a:extLst>
-              <a:ext uri="{FF2B5EF4-FFF2-40B4-BE49-F238E27FC236}">
-                <a16:creationId xmlns:a16="http://schemas.microsoft.com/office/drawing/2014/main" id="{73B7C5C5-1DB8-F74C-B24F-5BD97BE15399}"/>
-              </a:ext>
-            </a:extLst>
-          </p:cNvPr>
-          <p:cNvSpPr>
-            <a:spLocks noGrp="1"/>
-          </p:cNvSpPr>
-          <p:nvPr>
-            <p:ph type="title"/>
-          </p:nvPr>
-        </p:nvSpPr>
-        <p:spPr/>
-        <p:txBody>
-          <a:bodyPr/>
-          <a:lstStyle/>
-          <a:p>
-            <a:endParaRPr lang="en-US"/>
-          </a:p>
-        </p:txBody>
-      </p:sp>
-      <p:pic>
-        <p:nvPicPr>
-          <p:cNvPr id="8" name="Content Placeholder 7" descr="Text&#10;&#10;Description automatically generated">
-            <a:extLst>
-              <a:ext uri="{FF2B5EF4-FFF2-40B4-BE49-F238E27FC236}">
-                <a16:creationId xmlns:a16="http://schemas.microsoft.com/office/drawing/2014/main" id="{A6E73A43-D0DA-3244-B66D-B650E8B6FA6B}"/>
-              </a:ext>
-            </a:extLst>
-          </p:cNvPr>
-          <p:cNvPicPr>
-            <a:picLocks noGrp="1" noChangeAspect="1"/>
-          </p:cNvPicPr>
-          <p:nvPr>
-            <p:ph idx="1"/>
-          </p:nvPr>
-        </p:nvPicPr>
-        <p:blipFill>
-          <a:blip r:embed="rId2"/>
-          <a:stretch>
-            <a:fillRect/>
-          </a:stretch>
-        </p:blipFill>
-        <p:spPr>
-          <a:xfrm>
-            <a:off x="1587500" y="2336800"/>
-            <a:ext cx="5969000" cy="2870200"/>
-          </a:xfrm>
-        </p:spPr>
-      </p:pic>
-      <p:sp>
-        <p:nvSpPr>
-          <p:cNvPr id="4" name="Date Placeholder 3">
-            <a:extLst>
-              <a:ext uri="{FF2B5EF4-FFF2-40B4-BE49-F238E27FC236}">
-                <a16:creationId xmlns:a16="http://schemas.microsoft.com/office/drawing/2014/main" id="{86D77B73-DE0B-CE4C-B495-E89EFCE54422}"/>
-              </a:ext>
-            </a:extLst>
-          </p:cNvPr>
-          <p:cNvSpPr>
-            <a:spLocks noGrp="1"/>
-          </p:cNvSpPr>
-          <p:nvPr>
-            <p:ph type="dt" sz="half" idx="10"/>
-          </p:nvPr>
-        </p:nvSpPr>
-        <p:spPr/>
-        <p:txBody>
-          <a:bodyPr/>
-          <a:lstStyle/>
-          <a:p>
-            <a:pPr>
-              <a:defRPr/>
-            </a:pPr>
-            <a:r>
-              <a:rPr lang="en-US"/>
-              <a:t>PAKDD 2021</a:t>
-            </a:r>
-          </a:p>
-        </p:txBody>
-      </p:sp>
-      <p:sp>
-        <p:nvSpPr>
-          <p:cNvPr id="5" name="Footer Placeholder 4">
-            <a:extLst>
-              <a:ext uri="{FF2B5EF4-FFF2-40B4-BE49-F238E27FC236}">
-                <a16:creationId xmlns:a16="http://schemas.microsoft.com/office/drawing/2014/main" id="{99BBAF31-59DE-B24B-A8EB-85E50ECF0F96}"/>
-              </a:ext>
-            </a:extLst>
-          </p:cNvPr>
-          <p:cNvSpPr>
-            <a:spLocks noGrp="1"/>
-          </p:cNvSpPr>
-          <p:nvPr>
-            <p:ph type="ftr" sz="quarter" idx="11"/>
-          </p:nvPr>
-        </p:nvSpPr>
-        <p:spPr/>
-        <p:txBody>
-          <a:bodyPr/>
-          <a:lstStyle/>
-          <a:p>
-            <a:pPr>
-              <a:defRPr/>
-            </a:pPr>
-            <a:r>
-              <a:rPr lang="fi-FI"/>
-              <a:t>L. Akoglu, M. McGlohon, C. Faloutsos</a:t>
-            </a:r>
-            <a:endParaRPr lang="en-US"/>
-          </a:p>
-        </p:txBody>
-      </p:sp>
-      <p:sp>
-        <p:nvSpPr>
-          <p:cNvPr id="6" name="Slide Number Placeholder 5">
-            <a:extLst>
-              <a:ext uri="{FF2B5EF4-FFF2-40B4-BE49-F238E27FC236}">
-                <a16:creationId xmlns:a16="http://schemas.microsoft.com/office/drawing/2014/main" id="{FFF1C959-FDC1-964E-A40E-B9241F8C8C86}"/>
-              </a:ext>
-            </a:extLst>
-          </p:cNvPr>
-          <p:cNvSpPr>
-            <a:spLocks noGrp="1"/>
-          </p:cNvSpPr>
-          <p:nvPr>
-            <p:ph type="sldNum" sz="quarter" idx="12"/>
-          </p:nvPr>
-        </p:nvSpPr>
-        <p:spPr/>
-        <p:txBody>
-          <a:bodyPr/>
-          <a:lstStyle/>
-          <a:p>
-            <a:pPr>
-              <a:defRPr/>
-            </a:pPr>
-            <a:fld id="{F9B43987-7F84-BB4A-8611-CDF75B6A737D}" type="slidenum">
-              <a:rPr lang="en-US" smtClean="0"/>
-              <a:pPr>
-                <a:defRPr/>
-              </a:pPr>
-              <a:t>16</a:t>
-            </a:fld>
-            <a:endParaRPr lang="en-US"/>
-          </a:p>
-        </p:txBody>
-      </p:sp>
-    </p:spTree>
-    <p:extLst>
-      <p:ext uri="{BB962C8B-B14F-4D97-AF65-F5344CB8AC3E}">
-        <p14:creationId xmlns:p14="http://schemas.microsoft.com/office/powerpoint/2010/main" val="1645652329"/>
-      </p:ext>
-    </p:extLst>
-  </p:cSld>
-  <p:clrMapOvr>
-    <a:masterClrMapping/>
-  </p:clrMapOvr>
-  <p:transition/>
-</p:sld>
-</file>
-
-<file path=ppt/slides/slide17.xml><?xml version="1.0" encoding="utf-8"?>
-<p:sld xmlns:a="http://schemas.openxmlformats.org/drawingml/2006/main" xmlns:r="http://schemas.openxmlformats.org/officeDocument/2006/relationships" xmlns:p="http://schemas.openxmlformats.org/presentationml/2006/main">
-  <p:cSld>
-    <p:spTree>
-      <p:nvGrpSpPr>
-        <p:cNvPr id="1" name=""/>
-        <p:cNvGrpSpPr/>
-        <p:nvPr/>
-      </p:nvGrpSpPr>
-      <p:grpSpPr>
-        <a:xfrm>
-          <a:off x="0" y="0"/>
-          <a:ext cx="0" cy="0"/>
-          <a:chOff x="0" y="0"/>
-          <a:chExt cx="0" cy="0"/>
-        </a:xfrm>
-      </p:grpSpPr>
-      <p:sp>
-        <p:nvSpPr>
           <p:cNvPr id="22530" name="Footer Placeholder 4"/>
           <p:cNvSpPr>
             <a:spLocks noGrp="1"/>
@@ -8648,7 +8395,7 @@
             <a:fld id="{CA9CF61F-D18B-5946-9F36-FA97BCA712E8}" type="slidenum">
               <a:rPr lang="en-US" smtClean="0"/>
               <a:pPr/>
-              <a:t>17</a:t>
+              <a:t>15</a:t>
             </a:fld>
             <a:endParaRPr lang="en-US"/>
           </a:p>
@@ -8703,16 +8450,6 @@
             </a:r>
           </a:p>
           <a:p>
-            <a:pPr lvl="1"/>
-            <a:r>
-              <a:rPr lang="en-US" dirty="0">
-                <a:ea typeface="ＭＳ Ｐゴシック" charset="-128"/>
-                <a:cs typeface="ＭＳ Ｐゴシック" charset="-128"/>
-              </a:rPr>
-              <a:t>Why study anomalies?</a:t>
-            </a:r>
-          </a:p>
-          <a:p>
             <a:r>
               <a:rPr lang="en-US" dirty="0">
                 <a:ea typeface="ＭＳ Ｐゴシック" charset="-128"/>
@@ -8739,6 +8476,36 @@
               <a:t>Future</a:t>
             </a:r>
           </a:p>
+          <a:p>
+            <a:pPr lvl="1"/>
+            <a:r>
+              <a:rPr lang="en-US" dirty="0">
+                <a:ea typeface="ＭＳ Ｐゴシック" charset="-128"/>
+                <a:cs typeface="ＭＳ Ｐゴシック" charset="-128"/>
+              </a:rPr>
+              <a:t>Q1) definition?</a:t>
+            </a:r>
+          </a:p>
+          <a:p>
+            <a:pPr lvl="1"/>
+            <a:r>
+              <a:rPr lang="en-US" dirty="0">
+                <a:ea typeface="ＭＳ Ｐゴシック" charset="-128"/>
+                <a:cs typeface="ＭＳ Ｐゴシック" charset="-128"/>
+              </a:rPr>
+              <a:t>Q2) automation?</a:t>
+            </a:r>
+          </a:p>
+          <a:p>
+            <a:pPr lvl="1"/>
+            <a:r>
+              <a:rPr lang="en-US" dirty="0">
+                <a:ea typeface="ＭＳ Ｐゴシック" charset="-128"/>
+                <a:cs typeface="ＭＳ Ｐゴシック" charset="-128"/>
+              </a:rPr>
+              <a:t>Q3) next steps?</a:t>
+            </a:r>
+          </a:p>
         </p:txBody>
       </p:sp>
       <p:sp>
@@ -8751,7 +8518,7 @@
         </p:nvSpPr>
         <p:spPr bwMode="auto">
           <a:xfrm>
-            <a:off x="201613" y="1641475"/>
+            <a:off x="307975" y="4480037"/>
             <a:ext cx="377825" cy="290513"/>
           </a:xfrm>
           <a:prstGeom prst="rightArrow">
@@ -8847,6 +8614,415 @@
         </p:spPr>
       </p:pic>
     </p:spTree>
+    <p:extLst>
+      <p:ext uri="{BB962C8B-B14F-4D97-AF65-F5344CB8AC3E}">
+        <p14:creationId xmlns:p14="http://schemas.microsoft.com/office/powerpoint/2010/main" val="832683480"/>
+      </p:ext>
+    </p:extLst>
+  </p:cSld>
+  <p:clrMapOvr>
+    <a:masterClrMapping/>
+  </p:clrMapOvr>
+  <p:transition/>
+</p:sld>
+</file>
+
+<file path=ppt/slides/slide16.xml><?xml version="1.0" encoding="utf-8"?>
+<p:sld xmlns:a="http://schemas.openxmlformats.org/drawingml/2006/main" xmlns:r="http://schemas.openxmlformats.org/officeDocument/2006/relationships" xmlns:p="http://schemas.openxmlformats.org/presentationml/2006/main">
+  <p:cSld>
+    <p:spTree>
+      <p:nvGrpSpPr>
+        <p:cNvPr id="1" name=""/>
+        <p:cNvGrpSpPr/>
+        <p:nvPr/>
+      </p:nvGrpSpPr>
+      <p:grpSpPr>
+        <a:xfrm>
+          <a:off x="0" y="0"/>
+          <a:ext cx="0" cy="0"/>
+          <a:chOff x="0" y="0"/>
+          <a:chExt cx="0" cy="0"/>
+        </a:xfrm>
+      </p:grpSpPr>
+      <p:sp>
+        <p:nvSpPr>
+          <p:cNvPr id="2" name="Title 1">
+            <a:extLst>
+              <a:ext uri="{FF2B5EF4-FFF2-40B4-BE49-F238E27FC236}">
+                <a16:creationId xmlns:a16="http://schemas.microsoft.com/office/drawing/2014/main" id="{4FFF780A-4AC0-E947-9E60-C651A93EFC53}"/>
+              </a:ext>
+            </a:extLst>
+          </p:cNvPr>
+          <p:cNvSpPr>
+            <a:spLocks noGrp="1"/>
+          </p:cNvSpPr>
+          <p:nvPr>
+            <p:ph type="title"/>
+          </p:nvPr>
+        </p:nvSpPr>
+        <p:spPr/>
+        <p:txBody>
+          <a:bodyPr/>
+          <a:lstStyle/>
+          <a:p>
+            <a:endParaRPr lang="en-US"/>
+          </a:p>
+        </p:txBody>
+      </p:sp>
+      <p:pic>
+        <p:nvPicPr>
+          <p:cNvPr id="8" name="Content Placeholder 7" descr="Text&#10;&#10;Description automatically generated">
+            <a:extLst>
+              <a:ext uri="{FF2B5EF4-FFF2-40B4-BE49-F238E27FC236}">
+                <a16:creationId xmlns:a16="http://schemas.microsoft.com/office/drawing/2014/main" id="{EA46362B-79B6-BC45-B817-6D187BCD94BC}"/>
+              </a:ext>
+            </a:extLst>
+          </p:cNvPr>
+          <p:cNvPicPr>
+            <a:picLocks noGrp="1" noChangeAspect="1"/>
+          </p:cNvPicPr>
+          <p:nvPr>
+            <p:ph idx="1"/>
+          </p:nvPr>
+        </p:nvPicPr>
+        <p:blipFill>
+          <a:blip r:embed="rId2"/>
+          <a:stretch>
+            <a:fillRect/>
+          </a:stretch>
+        </p:blipFill>
+        <p:spPr>
+          <a:xfrm>
+            <a:off x="685800" y="1920168"/>
+            <a:ext cx="7772400" cy="3703463"/>
+          </a:xfrm>
+        </p:spPr>
+      </p:pic>
+      <p:sp>
+        <p:nvSpPr>
+          <p:cNvPr id="4" name="Date Placeholder 3">
+            <a:extLst>
+              <a:ext uri="{FF2B5EF4-FFF2-40B4-BE49-F238E27FC236}">
+                <a16:creationId xmlns:a16="http://schemas.microsoft.com/office/drawing/2014/main" id="{184406FC-1EBE-C643-896C-C61F4BA7160A}"/>
+              </a:ext>
+            </a:extLst>
+          </p:cNvPr>
+          <p:cNvSpPr>
+            <a:spLocks noGrp="1"/>
+          </p:cNvSpPr>
+          <p:nvPr>
+            <p:ph type="dt" sz="half" idx="10"/>
+          </p:nvPr>
+        </p:nvSpPr>
+        <p:spPr/>
+        <p:txBody>
+          <a:bodyPr/>
+          <a:lstStyle/>
+          <a:p>
+            <a:pPr>
+              <a:defRPr/>
+            </a:pPr>
+            <a:r>
+              <a:rPr lang="en-US"/>
+              <a:t>PAKDD 2021</a:t>
+            </a:r>
+          </a:p>
+        </p:txBody>
+      </p:sp>
+      <p:sp>
+        <p:nvSpPr>
+          <p:cNvPr id="5" name="Footer Placeholder 4">
+            <a:extLst>
+              <a:ext uri="{FF2B5EF4-FFF2-40B4-BE49-F238E27FC236}">
+                <a16:creationId xmlns:a16="http://schemas.microsoft.com/office/drawing/2014/main" id="{858F08FC-69BA-A044-B568-2D5259DB1102}"/>
+              </a:ext>
+            </a:extLst>
+          </p:cNvPr>
+          <p:cNvSpPr>
+            <a:spLocks noGrp="1"/>
+          </p:cNvSpPr>
+          <p:nvPr>
+            <p:ph type="ftr" sz="quarter" idx="11"/>
+          </p:nvPr>
+        </p:nvSpPr>
+        <p:spPr/>
+        <p:txBody>
+          <a:bodyPr/>
+          <a:lstStyle/>
+          <a:p>
+            <a:pPr>
+              <a:defRPr/>
+            </a:pPr>
+            <a:r>
+              <a:rPr lang="fi-FI"/>
+              <a:t>L. Akoglu, M. McGlohon, C. Faloutsos</a:t>
+            </a:r>
+            <a:endParaRPr lang="en-US"/>
+          </a:p>
+        </p:txBody>
+      </p:sp>
+      <p:sp>
+        <p:nvSpPr>
+          <p:cNvPr id="6" name="Slide Number Placeholder 5">
+            <a:extLst>
+              <a:ext uri="{FF2B5EF4-FFF2-40B4-BE49-F238E27FC236}">
+                <a16:creationId xmlns:a16="http://schemas.microsoft.com/office/drawing/2014/main" id="{B0A39F98-FAD7-F443-84E7-BAD1EDADA6C8}"/>
+              </a:ext>
+            </a:extLst>
+          </p:cNvPr>
+          <p:cNvSpPr>
+            <a:spLocks noGrp="1"/>
+          </p:cNvSpPr>
+          <p:nvPr>
+            <p:ph type="sldNum" sz="quarter" idx="12"/>
+          </p:nvPr>
+        </p:nvSpPr>
+        <p:spPr/>
+        <p:txBody>
+          <a:bodyPr/>
+          <a:lstStyle/>
+          <a:p>
+            <a:pPr>
+              <a:defRPr/>
+            </a:pPr>
+            <a:fld id="{F9B43987-7F84-BB4A-8611-CDF75B6A737D}" type="slidenum">
+              <a:rPr lang="en-US" smtClean="0"/>
+              <a:pPr>
+                <a:defRPr/>
+              </a:pPr>
+              <a:t>16</a:t>
+            </a:fld>
+            <a:endParaRPr lang="en-US"/>
+          </a:p>
+        </p:txBody>
+      </p:sp>
+    </p:spTree>
+    <p:extLst>
+      <p:ext uri="{BB962C8B-B14F-4D97-AF65-F5344CB8AC3E}">
+        <p14:creationId xmlns:p14="http://schemas.microsoft.com/office/powerpoint/2010/main" val="3459234371"/>
+      </p:ext>
+    </p:extLst>
+  </p:cSld>
+  <p:clrMapOvr>
+    <a:masterClrMapping/>
+  </p:clrMapOvr>
+  <p:transition/>
+</p:sld>
+</file>
+
+<file path=ppt/slides/slide17.xml><?xml version="1.0" encoding="utf-8"?>
+<p:sld xmlns:a="http://schemas.openxmlformats.org/drawingml/2006/main" xmlns:r="http://schemas.openxmlformats.org/officeDocument/2006/relationships" xmlns:p="http://schemas.openxmlformats.org/presentationml/2006/main">
+  <p:cSld>
+    <p:spTree>
+      <p:nvGrpSpPr>
+        <p:cNvPr id="1" name=""/>
+        <p:cNvGrpSpPr/>
+        <p:nvPr/>
+      </p:nvGrpSpPr>
+      <p:grpSpPr>
+        <a:xfrm>
+          <a:off x="0" y="0"/>
+          <a:ext cx="0" cy="0"/>
+          <a:chOff x="0" y="0"/>
+          <a:chExt cx="0" cy="0"/>
+        </a:xfrm>
+      </p:grpSpPr>
+      <p:sp>
+        <p:nvSpPr>
+          <p:cNvPr id="2" name="Title 1">
+            <a:extLst>
+              <a:ext uri="{FF2B5EF4-FFF2-40B4-BE49-F238E27FC236}">
+                <a16:creationId xmlns:a16="http://schemas.microsoft.com/office/drawing/2014/main" id="{A346E43C-F6C6-1B4D-9558-AD0FB0D00F7A}"/>
+              </a:ext>
+            </a:extLst>
+          </p:cNvPr>
+          <p:cNvSpPr>
+            <a:spLocks noGrp="1"/>
+          </p:cNvSpPr>
+          <p:nvPr>
+            <p:ph type="title"/>
+          </p:nvPr>
+        </p:nvSpPr>
+        <p:spPr/>
+        <p:txBody>
+          <a:bodyPr/>
+          <a:lstStyle/>
+          <a:p>
+            <a:r>
+              <a:rPr lang="en-US" dirty="0"/>
+              <a:t>Examples of models</a:t>
+            </a:r>
+          </a:p>
+        </p:txBody>
+      </p:sp>
+      <p:sp>
+        <p:nvSpPr>
+          <p:cNvPr id="3" name="Content Placeholder 2">
+            <a:extLst>
+              <a:ext uri="{FF2B5EF4-FFF2-40B4-BE49-F238E27FC236}">
+                <a16:creationId xmlns:a16="http://schemas.microsoft.com/office/drawing/2014/main" id="{8FBFD09B-8DD5-5B4B-95ED-E36940DEC032}"/>
+              </a:ext>
+            </a:extLst>
+          </p:cNvPr>
+          <p:cNvSpPr>
+            <a:spLocks noGrp="1"/>
+          </p:cNvSpPr>
+          <p:nvPr>
+            <p:ph idx="1"/>
+          </p:nvPr>
+        </p:nvSpPr>
+        <p:spPr/>
+        <p:txBody>
+          <a:bodyPr/>
+          <a:lstStyle/>
+          <a:p>
+            <a:r>
+              <a:rPr lang="en-US" dirty="0"/>
+              <a:t>Fractals / self-similarity (Norway)</a:t>
+            </a:r>
+          </a:p>
+          <a:p>
+            <a:r>
+              <a:rPr lang="en-US" dirty="0"/>
+              <a:t>Logistic parabola (flies; covid)</a:t>
+            </a:r>
+          </a:p>
+          <a:p>
+            <a:r>
+              <a:rPr lang="en-US" dirty="0" err="1"/>
+              <a:t>Lotka</a:t>
+            </a:r>
+            <a:r>
+              <a:rPr lang="en-US" dirty="0"/>
+              <a:t>-Volterra</a:t>
+            </a:r>
+          </a:p>
+          <a:p>
+            <a:r>
+              <a:rPr lang="en-US" dirty="0"/>
+              <a:t>Lorenz attractor (laser / synthetic )</a:t>
+            </a:r>
+          </a:p>
+          <a:p>
+            <a:r>
+              <a:rPr lang="en-US" dirty="0"/>
+              <a:t>Van der Pol / </a:t>
+            </a:r>
+            <a:r>
+              <a:rPr lang="en-US" dirty="0" err="1"/>
+              <a:t>FitzHugh</a:t>
+            </a:r>
+            <a:r>
+              <a:rPr lang="en-US" dirty="0"/>
+              <a:t>-Nagumo</a:t>
+            </a:r>
+          </a:p>
+        </p:txBody>
+      </p:sp>
+      <p:sp>
+        <p:nvSpPr>
+          <p:cNvPr id="4" name="Date Placeholder 3">
+            <a:extLst>
+              <a:ext uri="{FF2B5EF4-FFF2-40B4-BE49-F238E27FC236}">
+                <a16:creationId xmlns:a16="http://schemas.microsoft.com/office/drawing/2014/main" id="{03951C1E-0BF0-C642-BCBD-EFC883CDF7A7}"/>
+              </a:ext>
+            </a:extLst>
+          </p:cNvPr>
+          <p:cNvSpPr>
+            <a:spLocks noGrp="1"/>
+          </p:cNvSpPr>
+          <p:nvPr>
+            <p:ph type="dt" sz="half" idx="10"/>
+          </p:nvPr>
+        </p:nvSpPr>
+        <p:spPr/>
+        <p:txBody>
+          <a:bodyPr/>
+          <a:lstStyle/>
+          <a:p>
+            <a:pPr>
+              <a:defRPr/>
+            </a:pPr>
+            <a:r>
+              <a:rPr lang="en-US"/>
+              <a:t>PAKDD 2021</a:t>
+            </a:r>
+          </a:p>
+        </p:txBody>
+      </p:sp>
+      <p:sp>
+        <p:nvSpPr>
+          <p:cNvPr id="5" name="Footer Placeholder 4">
+            <a:extLst>
+              <a:ext uri="{FF2B5EF4-FFF2-40B4-BE49-F238E27FC236}">
+                <a16:creationId xmlns:a16="http://schemas.microsoft.com/office/drawing/2014/main" id="{E8D6249B-43CE-FD4A-9032-FBEB8C04971B}"/>
+              </a:ext>
+            </a:extLst>
+          </p:cNvPr>
+          <p:cNvSpPr>
+            <a:spLocks noGrp="1"/>
+          </p:cNvSpPr>
+          <p:nvPr>
+            <p:ph type="ftr" sz="quarter" idx="11"/>
+          </p:nvPr>
+        </p:nvSpPr>
+        <p:spPr/>
+        <p:txBody>
+          <a:bodyPr/>
+          <a:lstStyle/>
+          <a:p>
+            <a:pPr>
+              <a:defRPr/>
+            </a:pPr>
+            <a:r>
+              <a:rPr lang="fi-FI"/>
+              <a:t>L. Akoglu, M. McGlohon, C. Faloutsos</a:t>
+            </a:r>
+            <a:endParaRPr lang="en-US"/>
+          </a:p>
+        </p:txBody>
+      </p:sp>
+      <p:sp>
+        <p:nvSpPr>
+          <p:cNvPr id="6" name="Slide Number Placeholder 5">
+            <a:extLst>
+              <a:ext uri="{FF2B5EF4-FFF2-40B4-BE49-F238E27FC236}">
+                <a16:creationId xmlns:a16="http://schemas.microsoft.com/office/drawing/2014/main" id="{A14DD527-1BCF-3747-81F3-8EE0D9AAB32E}"/>
+              </a:ext>
+            </a:extLst>
+          </p:cNvPr>
+          <p:cNvSpPr>
+            <a:spLocks noGrp="1"/>
+          </p:cNvSpPr>
+          <p:nvPr>
+            <p:ph type="sldNum" sz="quarter" idx="12"/>
+          </p:nvPr>
+        </p:nvSpPr>
+        <p:spPr/>
+        <p:txBody>
+          <a:bodyPr/>
+          <a:lstStyle/>
+          <a:p>
+            <a:pPr>
+              <a:defRPr/>
+            </a:pPr>
+            <a:fld id="{F9B43987-7F84-BB4A-8611-CDF75B6A737D}" type="slidenum">
+              <a:rPr lang="en-US" smtClean="0"/>
+              <a:pPr>
+                <a:defRPr/>
+              </a:pPr>
+              <a:t>17</a:t>
+            </a:fld>
+            <a:endParaRPr lang="en-US"/>
+          </a:p>
+        </p:txBody>
+      </p:sp>
+    </p:spTree>
+    <p:extLst>
+      <p:ext uri="{BB962C8B-B14F-4D97-AF65-F5344CB8AC3E}">
+        <p14:creationId xmlns:p14="http://schemas.microsoft.com/office/powerpoint/2010/main" val="2715658193"/>
+      </p:ext>
+    </p:extLst>
   </p:cSld>
   <p:clrMapOvr>
     <a:masterClrMapping/>
@@ -8874,467 +9050,6 @@
       </p:grpSpPr>
       <p:sp>
         <p:nvSpPr>
-          <p:cNvPr id="2" name="Title 1">
-            <a:extLst>
-              <a:ext uri="{FF2B5EF4-FFF2-40B4-BE49-F238E27FC236}">
-                <a16:creationId xmlns:a16="http://schemas.microsoft.com/office/drawing/2014/main" id="{DAF0DF69-948A-8149-A676-8D6EA2D37C94}"/>
-              </a:ext>
-            </a:extLst>
-          </p:cNvPr>
-          <p:cNvSpPr>
-            <a:spLocks noGrp="1"/>
-          </p:cNvSpPr>
-          <p:nvPr>
-            <p:ph type="title"/>
-          </p:nvPr>
-        </p:nvSpPr>
-        <p:spPr/>
-        <p:txBody>
-          <a:bodyPr/>
-          <a:lstStyle/>
-          <a:p>
-            <a:r>
-              <a:rPr lang="en-US" dirty="0"/>
-              <a:t>P1.3.1. Outliers</a:t>
-            </a:r>
-          </a:p>
-        </p:txBody>
-      </p:sp>
-      <p:sp>
-        <p:nvSpPr>
-          <p:cNvPr id="3" name="Content Placeholder 2">
-            <a:extLst>
-              <a:ext uri="{FF2B5EF4-FFF2-40B4-BE49-F238E27FC236}">
-                <a16:creationId xmlns:a16="http://schemas.microsoft.com/office/drawing/2014/main" id="{AF6D0B97-71DF-3147-9690-794FC3B99AF9}"/>
-              </a:ext>
-            </a:extLst>
-          </p:cNvPr>
-          <p:cNvSpPr>
-            <a:spLocks noGrp="1"/>
-          </p:cNvSpPr>
-          <p:nvPr>
-            <p:ph idx="1"/>
-          </p:nvPr>
-        </p:nvSpPr>
-        <p:spPr/>
-        <p:txBody>
-          <a:bodyPr/>
-          <a:lstStyle/>
-          <a:p>
-            <a:r>
-              <a:rPr lang="en-US" dirty="0"/>
-              <a:t>Which node(s) are strange?</a:t>
-            </a:r>
-          </a:p>
-          <a:p>
-            <a:pPr lvl="1"/>
-            <a:r>
-              <a:rPr lang="en-US" dirty="0"/>
-              <a:t>Q: How to start?</a:t>
-            </a:r>
-          </a:p>
-        </p:txBody>
-      </p:sp>
-      <p:sp>
-        <p:nvSpPr>
-          <p:cNvPr id="4" name="Date Placeholder 3">
-            <a:extLst>
-              <a:ext uri="{FF2B5EF4-FFF2-40B4-BE49-F238E27FC236}">
-                <a16:creationId xmlns:a16="http://schemas.microsoft.com/office/drawing/2014/main" id="{E4B24557-0ACD-5B41-9409-91BD3BE2A412}"/>
-              </a:ext>
-            </a:extLst>
-          </p:cNvPr>
-          <p:cNvSpPr>
-            <a:spLocks noGrp="1"/>
-          </p:cNvSpPr>
-          <p:nvPr>
-            <p:ph type="dt" sz="half" idx="10"/>
-          </p:nvPr>
-        </p:nvSpPr>
-        <p:spPr/>
-        <p:txBody>
-          <a:bodyPr/>
-          <a:lstStyle/>
-          <a:p>
-            <a:pPr>
-              <a:defRPr/>
-            </a:pPr>
-            <a:r>
-              <a:rPr lang="en-US" dirty="0"/>
-              <a:t>WWW'2021  Tutorial</a:t>
-            </a:r>
-          </a:p>
-        </p:txBody>
-      </p:sp>
-      <p:sp>
-        <p:nvSpPr>
-          <p:cNvPr id="5" name="Footer Placeholder 4">
-            <a:extLst>
-              <a:ext uri="{FF2B5EF4-FFF2-40B4-BE49-F238E27FC236}">
-                <a16:creationId xmlns:a16="http://schemas.microsoft.com/office/drawing/2014/main" id="{B2DBD683-4CC7-8F4F-97C0-75C45EBA1C66}"/>
-              </a:ext>
-            </a:extLst>
-          </p:cNvPr>
-          <p:cNvSpPr>
-            <a:spLocks noGrp="1"/>
-          </p:cNvSpPr>
-          <p:nvPr>
-            <p:ph type="ftr" sz="quarter" idx="11"/>
-          </p:nvPr>
-        </p:nvSpPr>
-        <p:spPr/>
-        <p:txBody>
-          <a:bodyPr/>
-          <a:lstStyle/>
-          <a:p>
-            <a:pPr>
-              <a:defRPr/>
-            </a:pPr>
-            <a:r>
-              <a:rPr lang="en-US"/>
-              <a:t>S. Fakhraei and  C. Faloutsos</a:t>
-            </a:r>
-          </a:p>
-        </p:txBody>
-      </p:sp>
-      <p:sp>
-        <p:nvSpPr>
-          <p:cNvPr id="6" name="Slide Number Placeholder 5">
-            <a:extLst>
-              <a:ext uri="{FF2B5EF4-FFF2-40B4-BE49-F238E27FC236}">
-                <a16:creationId xmlns:a16="http://schemas.microsoft.com/office/drawing/2014/main" id="{67C115BD-69E7-6348-814E-C851F3955C7C}"/>
-              </a:ext>
-            </a:extLst>
-          </p:cNvPr>
-          <p:cNvSpPr>
-            <a:spLocks noGrp="1"/>
-          </p:cNvSpPr>
-          <p:nvPr>
-            <p:ph type="sldNum" sz="quarter" idx="12"/>
-          </p:nvPr>
-        </p:nvSpPr>
-        <p:spPr/>
-        <p:txBody>
-          <a:bodyPr/>
-          <a:lstStyle/>
-          <a:p>
-            <a:pPr>
-              <a:defRPr/>
-            </a:pPr>
-            <a:fld id="{F9B43987-7F84-BB4A-8611-CDF75B6A737D}" type="slidenum">
-              <a:rPr lang="en-US" smtClean="0"/>
-              <a:pPr>
-                <a:defRPr/>
-              </a:pPr>
-              <a:t>18</a:t>
-            </a:fld>
-            <a:endParaRPr lang="en-US"/>
-          </a:p>
-        </p:txBody>
-      </p:sp>
-      <p:pic>
-        <p:nvPicPr>
-          <p:cNvPr id="9" name="Picture 8">
-            <a:extLst>
-              <a:ext uri="{FF2B5EF4-FFF2-40B4-BE49-F238E27FC236}">
-                <a16:creationId xmlns:a16="http://schemas.microsoft.com/office/drawing/2014/main" id="{BC404E6B-12D2-0E48-B0C4-910DA2DB02A2}"/>
-              </a:ext>
-            </a:extLst>
-          </p:cNvPr>
-          <p:cNvPicPr>
-            <a:picLocks noChangeAspect="1"/>
-          </p:cNvPicPr>
-          <p:nvPr/>
-        </p:nvPicPr>
-        <p:blipFill>
-          <a:blip r:embed="rId2" cstate="screen">
-            <a:extLst>
-              <a:ext uri="{28A0092B-C50C-407E-A947-70E740481C1C}">
-                <a14:useLocalDpi xmlns:a14="http://schemas.microsoft.com/office/drawing/2010/main"/>
-              </a:ext>
-            </a:extLst>
-          </a:blip>
-          <a:stretch>
-            <a:fillRect/>
-          </a:stretch>
-        </p:blipFill>
-        <p:spPr>
-          <a:xfrm>
-            <a:off x="573656" y="3571197"/>
-            <a:ext cx="2292836" cy="1715864"/>
-          </a:xfrm>
-          <a:prstGeom prst="rect">
-            <a:avLst/>
-          </a:prstGeom>
-        </p:spPr>
-      </p:pic>
-    </p:spTree>
-    <p:extLst>
-      <p:ext uri="{BB962C8B-B14F-4D97-AF65-F5344CB8AC3E}">
-        <p14:creationId xmlns:p14="http://schemas.microsoft.com/office/powerpoint/2010/main" val="2469548725"/>
-      </p:ext>
-    </p:extLst>
-  </p:cSld>
-  <p:clrMapOvr>
-    <a:masterClrMapping/>
-  </p:clrMapOvr>
-  <p:transition/>
-</p:sld>
-</file>
-
-<file path=ppt/slides/slide19.xml><?xml version="1.0" encoding="utf-8"?>
-<p:sld xmlns:a="http://schemas.openxmlformats.org/drawingml/2006/main" xmlns:r="http://schemas.openxmlformats.org/officeDocument/2006/relationships" xmlns:p="http://schemas.openxmlformats.org/presentationml/2006/main">
-  <p:cSld>
-    <p:spTree>
-      <p:nvGrpSpPr>
-        <p:cNvPr id="1" name=""/>
-        <p:cNvGrpSpPr/>
-        <p:nvPr/>
-      </p:nvGrpSpPr>
-      <p:grpSpPr>
-        <a:xfrm>
-          <a:off x="0" y="0"/>
-          <a:ext cx="0" cy="0"/>
-          <a:chOff x="0" y="0"/>
-          <a:chExt cx="0" cy="0"/>
-        </a:xfrm>
-      </p:grpSpPr>
-      <p:sp>
-        <p:nvSpPr>
-          <p:cNvPr id="2" name="Title 1">
-            <a:extLst>
-              <a:ext uri="{FF2B5EF4-FFF2-40B4-BE49-F238E27FC236}">
-                <a16:creationId xmlns:a16="http://schemas.microsoft.com/office/drawing/2014/main" id="{DAF0DF69-948A-8149-A676-8D6EA2D37C94}"/>
-              </a:ext>
-            </a:extLst>
-          </p:cNvPr>
-          <p:cNvSpPr>
-            <a:spLocks noGrp="1"/>
-          </p:cNvSpPr>
-          <p:nvPr>
-            <p:ph type="title"/>
-          </p:nvPr>
-        </p:nvSpPr>
-        <p:spPr/>
-        <p:txBody>
-          <a:bodyPr/>
-          <a:lstStyle/>
-          <a:p>
-            <a:r>
-              <a:rPr lang="en-US" dirty="0"/>
-              <a:t>P1.3.1. Outliers</a:t>
-            </a:r>
-          </a:p>
-        </p:txBody>
-      </p:sp>
-      <p:sp>
-        <p:nvSpPr>
-          <p:cNvPr id="3" name="Content Placeholder 2">
-            <a:extLst>
-              <a:ext uri="{FF2B5EF4-FFF2-40B4-BE49-F238E27FC236}">
-                <a16:creationId xmlns:a16="http://schemas.microsoft.com/office/drawing/2014/main" id="{AF6D0B97-71DF-3147-9690-794FC3B99AF9}"/>
-              </a:ext>
-            </a:extLst>
-          </p:cNvPr>
-          <p:cNvSpPr>
-            <a:spLocks noGrp="1"/>
-          </p:cNvSpPr>
-          <p:nvPr>
-            <p:ph idx="1"/>
-          </p:nvPr>
-        </p:nvSpPr>
-        <p:spPr/>
-        <p:txBody>
-          <a:bodyPr/>
-          <a:lstStyle/>
-          <a:p>
-            <a:r>
-              <a:rPr lang="en-US" dirty="0"/>
-              <a:t>Which node(s) are strange?</a:t>
-            </a:r>
-          </a:p>
-          <a:p>
-            <a:pPr lvl="1"/>
-            <a:r>
-              <a:rPr lang="en-US" dirty="0"/>
-              <a:t>Q: How to start?</a:t>
-            </a:r>
-          </a:p>
-          <a:p>
-            <a:pPr lvl="1"/>
-            <a:r>
-              <a:rPr lang="en-US" dirty="0"/>
-              <a:t>A1: egonet; and extract node features</a:t>
-            </a:r>
-          </a:p>
-        </p:txBody>
-      </p:sp>
-      <p:sp>
-        <p:nvSpPr>
-          <p:cNvPr id="4" name="Date Placeholder 3">
-            <a:extLst>
-              <a:ext uri="{FF2B5EF4-FFF2-40B4-BE49-F238E27FC236}">
-                <a16:creationId xmlns:a16="http://schemas.microsoft.com/office/drawing/2014/main" id="{E4B24557-0ACD-5B41-9409-91BD3BE2A412}"/>
-              </a:ext>
-            </a:extLst>
-          </p:cNvPr>
-          <p:cNvSpPr>
-            <a:spLocks noGrp="1"/>
-          </p:cNvSpPr>
-          <p:nvPr>
-            <p:ph type="dt" sz="half" idx="10"/>
-          </p:nvPr>
-        </p:nvSpPr>
-        <p:spPr/>
-        <p:txBody>
-          <a:bodyPr/>
-          <a:lstStyle/>
-          <a:p>
-            <a:pPr>
-              <a:defRPr/>
-            </a:pPr>
-            <a:r>
-              <a:rPr lang="en-US" dirty="0"/>
-              <a:t>WWW'2021  Tutorial</a:t>
-            </a:r>
-          </a:p>
-        </p:txBody>
-      </p:sp>
-      <p:sp>
-        <p:nvSpPr>
-          <p:cNvPr id="5" name="Footer Placeholder 4">
-            <a:extLst>
-              <a:ext uri="{FF2B5EF4-FFF2-40B4-BE49-F238E27FC236}">
-                <a16:creationId xmlns:a16="http://schemas.microsoft.com/office/drawing/2014/main" id="{B2DBD683-4CC7-8F4F-97C0-75C45EBA1C66}"/>
-              </a:ext>
-            </a:extLst>
-          </p:cNvPr>
-          <p:cNvSpPr>
-            <a:spLocks noGrp="1"/>
-          </p:cNvSpPr>
-          <p:nvPr>
-            <p:ph type="ftr" sz="quarter" idx="11"/>
-          </p:nvPr>
-        </p:nvSpPr>
-        <p:spPr/>
-        <p:txBody>
-          <a:bodyPr/>
-          <a:lstStyle/>
-          <a:p>
-            <a:pPr>
-              <a:defRPr/>
-            </a:pPr>
-            <a:r>
-              <a:rPr lang="en-US"/>
-              <a:t>S. Fakhraei and  C. Faloutsos</a:t>
-            </a:r>
-          </a:p>
-        </p:txBody>
-      </p:sp>
-      <p:sp>
-        <p:nvSpPr>
-          <p:cNvPr id="6" name="Slide Number Placeholder 5">
-            <a:extLst>
-              <a:ext uri="{FF2B5EF4-FFF2-40B4-BE49-F238E27FC236}">
-                <a16:creationId xmlns:a16="http://schemas.microsoft.com/office/drawing/2014/main" id="{67C115BD-69E7-6348-814E-C851F3955C7C}"/>
-              </a:ext>
-            </a:extLst>
-          </p:cNvPr>
-          <p:cNvSpPr>
-            <a:spLocks noGrp="1"/>
-          </p:cNvSpPr>
-          <p:nvPr>
-            <p:ph type="sldNum" sz="quarter" idx="12"/>
-          </p:nvPr>
-        </p:nvSpPr>
-        <p:spPr/>
-        <p:txBody>
-          <a:bodyPr/>
-          <a:lstStyle/>
-          <a:p>
-            <a:pPr>
-              <a:defRPr/>
-            </a:pPr>
-            <a:fld id="{F9B43987-7F84-BB4A-8611-CDF75B6A737D}" type="slidenum">
-              <a:rPr lang="en-US" smtClean="0"/>
-              <a:pPr>
-                <a:defRPr/>
-              </a:pPr>
-              <a:t>19</a:t>
-            </a:fld>
-            <a:endParaRPr lang="en-US"/>
-          </a:p>
-        </p:txBody>
-      </p:sp>
-      <p:pic>
-        <p:nvPicPr>
-          <p:cNvPr id="8" name="Picture 7">
-            <a:extLst>
-              <a:ext uri="{FF2B5EF4-FFF2-40B4-BE49-F238E27FC236}">
-                <a16:creationId xmlns:a16="http://schemas.microsoft.com/office/drawing/2014/main" id="{EFE2B29E-80CF-2F48-AC14-B5251FDF98CD}"/>
-              </a:ext>
-            </a:extLst>
-          </p:cNvPr>
-          <p:cNvPicPr>
-            <a:picLocks noChangeAspect="1"/>
-          </p:cNvPicPr>
-          <p:nvPr/>
-        </p:nvPicPr>
-        <p:blipFill>
-          <a:blip r:embed="rId2" cstate="screen">
-            <a:extLst>
-              <a:ext uri="{28A0092B-C50C-407E-A947-70E740481C1C}">
-                <a14:useLocalDpi xmlns:a14="http://schemas.microsoft.com/office/drawing/2010/main"/>
-              </a:ext>
-            </a:extLst>
-          </a:blip>
-          <a:stretch>
-            <a:fillRect/>
-          </a:stretch>
-        </p:blipFill>
-        <p:spPr>
-          <a:xfrm>
-            <a:off x="573656" y="3571197"/>
-            <a:ext cx="2292836" cy="1715864"/>
-          </a:xfrm>
-          <a:prstGeom prst="rect">
-            <a:avLst/>
-          </a:prstGeom>
-        </p:spPr>
-      </p:pic>
-    </p:spTree>
-    <p:extLst>
-      <p:ext uri="{BB962C8B-B14F-4D97-AF65-F5344CB8AC3E}">
-        <p14:creationId xmlns:p14="http://schemas.microsoft.com/office/powerpoint/2010/main" val="684378947"/>
-      </p:ext>
-    </p:extLst>
-  </p:cSld>
-  <p:clrMapOvr>
-    <a:masterClrMapping/>
-  </p:clrMapOvr>
-  <p:transition/>
-</p:sld>
-</file>
-
-<file path=ppt/slides/slide2.xml><?xml version="1.0" encoding="utf-8"?>
-<p:sld xmlns:a="http://schemas.openxmlformats.org/drawingml/2006/main" xmlns:r="http://schemas.openxmlformats.org/officeDocument/2006/relationships" xmlns:p="http://schemas.openxmlformats.org/presentationml/2006/main">
-  <p:cSld>
-    <p:spTree>
-      <p:nvGrpSpPr>
-        <p:cNvPr id="1" name=""/>
-        <p:cNvGrpSpPr/>
-        <p:nvPr/>
-      </p:nvGrpSpPr>
-      <p:grpSpPr>
-        <a:xfrm>
-          <a:off x="0" y="0"/>
-          <a:ext cx="0" cy="0"/>
-          <a:chOff x="0" y="0"/>
-          <a:chExt cx="0" cy="0"/>
-        </a:xfrm>
-      </p:grpSpPr>
-      <p:sp>
-        <p:nvSpPr>
           <p:cNvPr id="22530" name="Footer Placeholder 4"/>
           <p:cNvSpPr>
             <a:spLocks noGrp="1"/>
@@ -9378,266 +9093,7 @@
             <a:fld id="{CA9CF61F-D18B-5946-9F36-FA97BCA712E8}" type="slidenum">
               <a:rPr lang="en-US" smtClean="0"/>
               <a:pPr/>
-              <a:t>2</a:t>
-            </a:fld>
-            <a:endParaRPr lang="en-US"/>
-          </a:p>
-        </p:txBody>
-      </p:sp>
-      <p:sp>
-        <p:nvSpPr>
-          <p:cNvPr id="22532" name="Rectangle 2"/>
-          <p:cNvSpPr>
-            <a:spLocks noGrp="1" noChangeArrowheads="1"/>
-          </p:cNvSpPr>
-          <p:nvPr>
-            <p:ph type="title"/>
-          </p:nvPr>
-        </p:nvSpPr>
-        <p:spPr/>
-        <p:txBody>
-          <a:bodyPr/>
-          <a:lstStyle/>
-          <a:p>
-            <a:r>
-              <a:rPr lang="en-US" sz="3600" dirty="0">
-                <a:ea typeface="ＭＳ Ｐゴシック" charset="-128"/>
-                <a:cs typeface="ＭＳ Ｐゴシック" charset="-128"/>
-              </a:rPr>
-              <a:t>Roadmap</a:t>
-            </a:r>
-          </a:p>
-        </p:txBody>
-      </p:sp>
-      <p:sp>
-        <p:nvSpPr>
-          <p:cNvPr id="22533" name="Rectangle 3"/>
-          <p:cNvSpPr>
-            <a:spLocks noGrp="1" noChangeArrowheads="1"/>
-          </p:cNvSpPr>
-          <p:nvPr>
-            <p:ph type="body" idx="1"/>
-          </p:nvPr>
-        </p:nvSpPr>
-        <p:spPr/>
-        <p:txBody>
-          <a:bodyPr/>
-          <a:lstStyle/>
-          <a:p>
-            <a:r>
-              <a:rPr lang="en-US" dirty="0">
-                <a:ea typeface="ＭＳ Ｐゴシック" charset="-128"/>
-                <a:cs typeface="ＭＳ Ｐゴシック" charset="-128"/>
-              </a:rPr>
-              <a:t>Introduction – Motivation</a:t>
-            </a:r>
-          </a:p>
-          <a:p>
-            <a:r>
-              <a:rPr lang="en-US" dirty="0">
-                <a:ea typeface="ＭＳ Ｐゴシック" charset="-128"/>
-                <a:cs typeface="ＭＳ Ｐゴシック" charset="-128"/>
-              </a:rPr>
-              <a:t>Past</a:t>
-            </a:r>
-          </a:p>
-          <a:p>
-            <a:r>
-              <a:rPr lang="en-US" dirty="0">
-                <a:ea typeface="ＭＳ Ｐゴシック" charset="-128"/>
-                <a:cs typeface="ＭＳ Ｐゴシック" charset="-128"/>
-              </a:rPr>
-              <a:t>Present</a:t>
-            </a:r>
-          </a:p>
-          <a:p>
-            <a:r>
-              <a:rPr lang="en-US" dirty="0">
-                <a:ea typeface="ＭＳ Ｐゴシック" charset="-128"/>
-                <a:cs typeface="ＭＳ Ｐゴシック" charset="-128"/>
-              </a:rPr>
-              <a:t>Future</a:t>
-            </a:r>
-          </a:p>
-        </p:txBody>
-      </p:sp>
-      <p:sp>
-        <p:nvSpPr>
-          <p:cNvPr id="22534" name="AutoShape 4"/>
-          <p:cNvSpPr>
-            <a:spLocks noChangeArrowheads="1"/>
-          </p:cNvSpPr>
-          <p:nvPr/>
-        </p:nvSpPr>
-        <p:spPr bwMode="auto">
-          <a:xfrm>
-            <a:off x="230187" y="3355430"/>
-            <a:ext cx="377825" cy="290513"/>
-          </a:xfrm>
-          <a:prstGeom prst="rightArrow">
-            <a:avLst>
-              <a:gd name="adj1" fmla="val 50000"/>
-              <a:gd name="adj2" fmla="val 32514"/>
-            </a:avLst>
-          </a:prstGeom>
-          <a:solidFill>
-            <a:schemeClr val="tx2"/>
-          </a:solidFill>
-          <a:ln w="28575">
-            <a:solidFill>
-              <a:schemeClr val="tx2"/>
-            </a:solidFill>
-            <a:miter lim="800000"/>
-            <a:headEnd type="none" w="sm" len="sm"/>
-            <a:tailEnd/>
-          </a:ln>
-        </p:spPr>
-        <p:txBody>
-          <a:bodyPr wrap="none" anchor="ctr">
-            <a:prstTxWarp prst="textNoShape">
-              <a:avLst/>
-            </a:prstTxWarp>
-          </a:bodyPr>
-          <a:lstStyle/>
-          <a:p>
-            <a:endParaRPr lang="en-US"/>
-          </a:p>
-        </p:txBody>
-      </p:sp>
-      <p:sp>
-        <p:nvSpPr>
-          <p:cNvPr id="22535" name="Date Placeholder 7"/>
-          <p:cNvSpPr>
-            <a:spLocks noGrp="1"/>
-          </p:cNvSpPr>
-          <p:nvPr>
-            <p:ph type="dt" sz="quarter" idx="10"/>
-          </p:nvPr>
-        </p:nvSpPr>
-        <p:spPr>
-          <a:noFill/>
-        </p:spPr>
-        <p:txBody>
-          <a:bodyPr/>
-          <a:lstStyle/>
-          <a:p>
-            <a:r>
-              <a:rPr lang="en-US"/>
-              <a:t>PAKDD 2021</a:t>
-            </a:r>
-          </a:p>
-        </p:txBody>
-      </p:sp>
-      <p:pic>
-        <p:nvPicPr>
-          <p:cNvPr id="8" name="Picture 7" descr="energygen-roads.jpg"/>
-          <p:cNvPicPr>
-            <a:picLocks noChangeAspect="1"/>
-          </p:cNvPicPr>
-          <p:nvPr/>
-        </p:nvPicPr>
-        <p:blipFill>
-          <a:blip r:embed="rId3" cstate="screen">
-            <a:extLst>
-              <a:ext uri="{28A0092B-C50C-407E-A947-70E740481C1C}">
-                <a14:useLocalDpi xmlns:a14="http://schemas.microsoft.com/office/drawing/2010/main"/>
-              </a:ext>
-            </a:extLst>
-          </a:blip>
-          <a:srcRect/>
-          <a:stretch>
-            <a:fillRect/>
-          </a:stretch>
-        </p:blipFill>
-        <p:spPr bwMode="auto">
-          <a:xfrm>
-            <a:off x="6267450" y="1371600"/>
-            <a:ext cx="2457450" cy="1212850"/>
-          </a:xfrm>
-          <a:prstGeom prst="rect">
-            <a:avLst/>
-          </a:prstGeom>
-          <a:noFill/>
-          <a:ln w="9525">
-            <a:noFill/>
-            <a:miter lim="800000"/>
-            <a:headEnd/>
-            <a:tailEnd/>
-          </a:ln>
-        </p:spPr>
-      </p:pic>
-    </p:spTree>
-  </p:cSld>
-  <p:clrMapOvr>
-    <a:masterClrMapping/>
-  </p:clrMapOvr>
-  <p:transition/>
-</p:sld>
-</file>
-
-<file path=ppt/slides/slide20.xml><?xml version="1.0" encoding="utf-8"?>
-<p:sld xmlns:a="http://schemas.openxmlformats.org/drawingml/2006/main" xmlns:r="http://schemas.openxmlformats.org/officeDocument/2006/relationships" xmlns:p="http://schemas.openxmlformats.org/presentationml/2006/main">
-  <p:cSld>
-    <p:spTree>
-      <p:nvGrpSpPr>
-        <p:cNvPr id="1" name=""/>
-        <p:cNvGrpSpPr/>
-        <p:nvPr/>
-      </p:nvGrpSpPr>
-      <p:grpSpPr>
-        <a:xfrm>
-          <a:off x="0" y="0"/>
-          <a:ext cx="0" cy="0"/>
-          <a:chOff x="0" y="0"/>
-          <a:chExt cx="0" cy="0"/>
-        </a:xfrm>
-      </p:grpSpPr>
-      <p:sp>
-        <p:nvSpPr>
-          <p:cNvPr id="22530" name="Footer Placeholder 4"/>
-          <p:cNvSpPr>
-            <a:spLocks noGrp="1"/>
-          </p:cNvSpPr>
-          <p:nvPr>
-            <p:ph type="ftr" sz="quarter" idx="11"/>
-          </p:nvPr>
-        </p:nvSpPr>
-        <p:spPr>
-          <a:noFill/>
-        </p:spPr>
-        <p:txBody>
-          <a:bodyPr/>
-          <a:lstStyle/>
-          <a:p>
-            <a:r>
-              <a:rPr lang="fi-FI"/>
-              <a:t>L. Akoglu, M. McGlohon, C. Faloutsos</a:t>
-            </a:r>
-            <a:endParaRPr lang="en-US"/>
-          </a:p>
-        </p:txBody>
-      </p:sp>
-      <p:sp>
-        <p:nvSpPr>
-          <p:cNvPr id="22531" name="Slide Number Placeholder 5"/>
-          <p:cNvSpPr>
-            <a:spLocks noGrp="1"/>
-          </p:cNvSpPr>
-          <p:nvPr>
-            <p:ph type="sldNum" sz="quarter" idx="12"/>
-          </p:nvPr>
-        </p:nvSpPr>
-        <p:spPr>
-          <a:noFill/>
-        </p:spPr>
-        <p:txBody>
-          <a:bodyPr/>
-          <a:lstStyle/>
-          <a:p>
-            <a:fld id="{CA9CF61F-D18B-5946-9F36-FA97BCA712E8}" type="slidenum">
-              <a:rPr lang="en-US" smtClean="0"/>
-              <a:pPr/>
-              <a:t>20</a:t>
+              <a:t>18</a:t>
             </a:fld>
             <a:endParaRPr lang="en-US"/>
           </a:p>
@@ -9888,14 +9344,14 @@
           </a:ln>
           <a:extLst>
             <a:ext uri="{909E8E84-426E-40dd-AFC4-6F175D3DCCD1}">
-              <a14:hiddenFill xmlns="" xmlns:a14="http://schemas.microsoft.com/office/drawing/2010/main">
+              <a14:hiddenFill xmlns:a14="http://schemas.microsoft.com/office/drawing/2010/main" xmlns="">
                 <a:solidFill>
                   <a:srgbClr val="FFFFFF"/>
                 </a:solidFill>
               </a14:hiddenFill>
             </a:ext>
             <a:ext uri="{91240B29-F687-4f45-9708-019B960494DF}">
-              <a14:hiddenLine xmlns="" xmlns:a14="http://schemas.microsoft.com/office/drawing/2010/main" w="9525">
+              <a14:hiddenLine xmlns:a14="http://schemas.microsoft.com/office/drawing/2010/main" xmlns="" w="9525">
                 <a:solidFill>
                   <a:srgbClr val="000000"/>
                 </a:solidFill>
@@ -9921,6 +9377,265 @@
 </p:sld>
 </file>
 
+<file path=ppt/slides/slide2.xml><?xml version="1.0" encoding="utf-8"?>
+<p:sld xmlns:a="http://schemas.openxmlformats.org/drawingml/2006/main" xmlns:r="http://schemas.openxmlformats.org/officeDocument/2006/relationships" xmlns:p="http://schemas.openxmlformats.org/presentationml/2006/main">
+  <p:cSld>
+    <p:spTree>
+      <p:nvGrpSpPr>
+        <p:cNvPr id="1" name=""/>
+        <p:cNvGrpSpPr/>
+        <p:nvPr/>
+      </p:nvGrpSpPr>
+      <p:grpSpPr>
+        <a:xfrm>
+          <a:off x="0" y="0"/>
+          <a:ext cx="0" cy="0"/>
+          <a:chOff x="0" y="0"/>
+          <a:chExt cx="0" cy="0"/>
+        </a:xfrm>
+      </p:grpSpPr>
+      <p:sp>
+        <p:nvSpPr>
+          <p:cNvPr id="22530" name="Footer Placeholder 4"/>
+          <p:cNvSpPr>
+            <a:spLocks noGrp="1"/>
+          </p:cNvSpPr>
+          <p:nvPr>
+            <p:ph type="ftr" sz="quarter" idx="11"/>
+          </p:nvPr>
+        </p:nvSpPr>
+        <p:spPr>
+          <a:noFill/>
+        </p:spPr>
+        <p:txBody>
+          <a:bodyPr/>
+          <a:lstStyle/>
+          <a:p>
+            <a:r>
+              <a:rPr lang="fi-FI"/>
+              <a:t>L. Akoglu, M. McGlohon, C. Faloutsos</a:t>
+            </a:r>
+            <a:endParaRPr lang="en-US"/>
+          </a:p>
+        </p:txBody>
+      </p:sp>
+      <p:sp>
+        <p:nvSpPr>
+          <p:cNvPr id="22531" name="Slide Number Placeholder 5"/>
+          <p:cNvSpPr>
+            <a:spLocks noGrp="1"/>
+          </p:cNvSpPr>
+          <p:nvPr>
+            <p:ph type="sldNum" sz="quarter" idx="12"/>
+          </p:nvPr>
+        </p:nvSpPr>
+        <p:spPr>
+          <a:noFill/>
+        </p:spPr>
+        <p:txBody>
+          <a:bodyPr/>
+          <a:lstStyle/>
+          <a:p>
+            <a:fld id="{CA9CF61F-D18B-5946-9F36-FA97BCA712E8}" type="slidenum">
+              <a:rPr lang="en-US" smtClean="0"/>
+              <a:pPr/>
+              <a:t>2</a:t>
+            </a:fld>
+            <a:endParaRPr lang="en-US"/>
+          </a:p>
+        </p:txBody>
+      </p:sp>
+      <p:sp>
+        <p:nvSpPr>
+          <p:cNvPr id="22532" name="Rectangle 2"/>
+          <p:cNvSpPr>
+            <a:spLocks noGrp="1" noChangeArrowheads="1"/>
+          </p:cNvSpPr>
+          <p:nvPr>
+            <p:ph type="title"/>
+          </p:nvPr>
+        </p:nvSpPr>
+        <p:spPr/>
+        <p:txBody>
+          <a:bodyPr/>
+          <a:lstStyle/>
+          <a:p>
+            <a:r>
+              <a:rPr lang="en-US" sz="3600" dirty="0">
+                <a:ea typeface="ＭＳ Ｐゴシック" charset="-128"/>
+                <a:cs typeface="ＭＳ Ｐゴシック" charset="-128"/>
+              </a:rPr>
+              <a:t>Roadmap</a:t>
+            </a:r>
+          </a:p>
+        </p:txBody>
+      </p:sp>
+      <p:sp>
+        <p:nvSpPr>
+          <p:cNvPr id="22533" name="Rectangle 3"/>
+          <p:cNvSpPr>
+            <a:spLocks noGrp="1" noChangeArrowheads="1"/>
+          </p:cNvSpPr>
+          <p:nvPr>
+            <p:ph type="body" idx="1"/>
+          </p:nvPr>
+        </p:nvSpPr>
+        <p:spPr/>
+        <p:txBody>
+          <a:bodyPr/>
+          <a:lstStyle/>
+          <a:p>
+            <a:r>
+              <a:rPr lang="en-US" dirty="0">
+                <a:ea typeface="ＭＳ Ｐゴシック" charset="-128"/>
+                <a:cs typeface="ＭＳ Ｐゴシック" charset="-128"/>
+              </a:rPr>
+              <a:t>Introduction – Motivation</a:t>
+            </a:r>
+          </a:p>
+          <a:p>
+            <a:r>
+              <a:rPr lang="en-US" dirty="0">
+                <a:ea typeface="ＭＳ Ｐゴシック" charset="-128"/>
+                <a:cs typeface="ＭＳ Ｐゴシック" charset="-128"/>
+              </a:rPr>
+              <a:t>Past</a:t>
+            </a:r>
+          </a:p>
+          <a:p>
+            <a:r>
+              <a:rPr lang="en-US" dirty="0">
+                <a:ea typeface="ＭＳ Ｐゴシック" charset="-128"/>
+                <a:cs typeface="ＭＳ Ｐゴシック" charset="-128"/>
+              </a:rPr>
+              <a:t>Present</a:t>
+            </a:r>
+          </a:p>
+          <a:p>
+            <a:r>
+              <a:rPr lang="en-US" dirty="0">
+                <a:ea typeface="ＭＳ Ｐゴシック" charset="-128"/>
+                <a:cs typeface="ＭＳ Ｐゴシック" charset="-128"/>
+              </a:rPr>
+              <a:t>Future</a:t>
+            </a:r>
+          </a:p>
+        </p:txBody>
+      </p:sp>
+      <p:sp>
+        <p:nvSpPr>
+          <p:cNvPr id="22534" name="AutoShape 4"/>
+          <p:cNvSpPr>
+            <a:spLocks noChangeArrowheads="1"/>
+          </p:cNvSpPr>
+          <p:nvPr/>
+        </p:nvSpPr>
+        <p:spPr bwMode="auto">
+          <a:xfrm>
+            <a:off x="230187" y="3355430"/>
+            <a:ext cx="377825" cy="290513"/>
+          </a:xfrm>
+          <a:prstGeom prst="rightArrow">
+            <a:avLst>
+              <a:gd name="adj1" fmla="val 50000"/>
+              <a:gd name="adj2" fmla="val 32514"/>
+            </a:avLst>
+          </a:prstGeom>
+          <a:solidFill>
+            <a:schemeClr val="tx2"/>
+          </a:solidFill>
+          <a:ln w="28575">
+            <a:solidFill>
+              <a:schemeClr val="tx2"/>
+            </a:solidFill>
+            <a:miter lim="800000"/>
+            <a:headEnd type="none" w="sm" len="sm"/>
+            <a:tailEnd/>
+          </a:ln>
+        </p:spPr>
+        <p:txBody>
+          <a:bodyPr wrap="none" anchor="ctr">
+            <a:prstTxWarp prst="textNoShape">
+              <a:avLst/>
+            </a:prstTxWarp>
+          </a:bodyPr>
+          <a:lstStyle/>
+          <a:p>
+            <a:endParaRPr lang="en-US"/>
+          </a:p>
+        </p:txBody>
+      </p:sp>
+      <p:sp>
+        <p:nvSpPr>
+          <p:cNvPr id="22535" name="Date Placeholder 7"/>
+          <p:cNvSpPr>
+            <a:spLocks noGrp="1"/>
+          </p:cNvSpPr>
+          <p:nvPr>
+            <p:ph type="dt" sz="quarter" idx="10"/>
+          </p:nvPr>
+        </p:nvSpPr>
+        <p:spPr>
+          <a:noFill/>
+        </p:spPr>
+        <p:txBody>
+          <a:bodyPr/>
+          <a:lstStyle/>
+          <a:p>
+            <a:r>
+              <a:rPr lang="en-US"/>
+              <a:t>PAKDD 2021</a:t>
+            </a:r>
+          </a:p>
+        </p:txBody>
+      </p:sp>
+      <p:pic>
+        <p:nvPicPr>
+          <p:cNvPr id="8" name="Picture 7" descr="energygen-roads.jpg"/>
+          <p:cNvPicPr>
+            <a:picLocks noChangeAspect="1"/>
+          </p:cNvPicPr>
+          <p:nvPr/>
+        </p:nvPicPr>
+        <p:blipFill>
+          <a:blip r:embed="rId3" cstate="screen">
+            <a:extLst>
+              <a:ext uri="{28A0092B-C50C-407E-A947-70E740481C1C}">
+                <a14:useLocalDpi xmlns:a14="http://schemas.microsoft.com/office/drawing/2010/main"/>
+              </a:ext>
+            </a:extLst>
+          </a:blip>
+          <a:srcRect/>
+          <a:stretch>
+            <a:fillRect/>
+          </a:stretch>
+        </p:blipFill>
+        <p:spPr bwMode="auto">
+          <a:xfrm>
+            <a:off x="6267450" y="1371600"/>
+            <a:ext cx="2457450" cy="1212850"/>
+          </a:xfrm>
+          <a:prstGeom prst="rect">
+            <a:avLst/>
+          </a:prstGeom>
+          <a:noFill/>
+          <a:ln w="9525">
+            <a:noFill/>
+            <a:miter lim="800000"/>
+            <a:headEnd/>
+            <a:tailEnd/>
+          </a:ln>
+        </p:spPr>
+      </p:pic>
+    </p:spTree>
+  </p:cSld>
+  <p:clrMapOvr>
+    <a:masterClrMapping/>
+  </p:clrMapOvr>
+  <p:transition/>
+</p:sld>
+</file>
+
 <file path=ppt/slides/slide3.xml><?xml version="1.0" encoding="utf-8"?>
 <p:sld xmlns:a="http://schemas.openxmlformats.org/drawingml/2006/main" xmlns:r="http://schemas.openxmlformats.org/officeDocument/2006/relationships" xmlns:p="http://schemas.openxmlformats.org/presentationml/2006/main">
   <p:cSld>
@@ -10082,6 +9797,16 @@
                 <a:cs typeface="ＭＳ Ｐゴシック" charset="-128"/>
               </a:rPr>
               <a:t>Q2) automation?</a:t>
+            </a:r>
+          </a:p>
+          <a:p>
+            <a:pPr lvl="1"/>
+            <a:r>
+              <a:rPr lang="en-US" dirty="0">
+                <a:ea typeface="ＭＳ Ｐゴシック" charset="-128"/>
+                <a:cs typeface="ＭＳ Ｐゴシック" charset="-128"/>
+              </a:rPr>
+              <a:t>Q3) next steps?</a:t>
             </a:r>
           </a:p>
         </p:txBody>
@@ -10302,6 +10027,27 @@
             <a:r>
               <a:rPr lang="en-US" dirty="0"/>
               <a:t>A) no, but: look for better models/biases/priors</a:t>
+            </a:r>
+          </a:p>
+          <a:p>
+            <a:r>
+              <a:rPr lang="en-US" dirty="0"/>
+              <a:t>Q3) next steps?</a:t>
+            </a:r>
+          </a:p>
+          <a:p>
+            <a:pPr lvl="1"/>
+            <a:r>
+              <a:rPr lang="en-US" dirty="0"/>
+              <a:t>A) cross-disciplinarity -&gt; </a:t>
+            </a:r>
+            <a:r>
+              <a:rPr lang="en-US" dirty="0" err="1"/>
+              <a:t>new+better</a:t>
+            </a:r>
+            <a:r>
+              <a:rPr lang="en-US" dirty="0"/>
+              <a:t> models</a:t>
             </a:r>
           </a:p>
           <a:p>
@@ -11756,160 +11502,271 @@
       </p:grpSpPr>
       <p:sp>
         <p:nvSpPr>
-          <p:cNvPr id="2" name="Title 1">
+          <p:cNvPr id="22530" name="Footer Placeholder 4"/>
+          <p:cNvSpPr>
+            <a:spLocks noGrp="1"/>
+          </p:cNvSpPr>
+          <p:nvPr>
+            <p:ph type="ftr" sz="quarter" idx="11"/>
+          </p:nvPr>
+        </p:nvSpPr>
+        <p:spPr>
+          <a:noFill/>
+        </p:spPr>
+        <p:txBody>
+          <a:bodyPr/>
+          <a:lstStyle/>
+          <a:p>
+            <a:r>
+              <a:rPr lang="fi-FI"/>
+              <a:t>L. Akoglu, M. McGlohon, C. Faloutsos</a:t>
+            </a:r>
+            <a:endParaRPr lang="en-US"/>
+          </a:p>
+        </p:txBody>
+      </p:sp>
+      <p:sp>
+        <p:nvSpPr>
+          <p:cNvPr id="22531" name="Slide Number Placeholder 5"/>
+          <p:cNvSpPr>
+            <a:spLocks noGrp="1"/>
+          </p:cNvSpPr>
+          <p:nvPr>
+            <p:ph type="sldNum" sz="quarter" idx="12"/>
+          </p:nvPr>
+        </p:nvSpPr>
+        <p:spPr>
+          <a:noFill/>
+        </p:spPr>
+        <p:txBody>
+          <a:bodyPr/>
+          <a:lstStyle/>
+          <a:p>
+            <a:fld id="{CA9CF61F-D18B-5946-9F36-FA97BCA712E8}" type="slidenum">
+              <a:rPr lang="en-US" smtClean="0"/>
+              <a:pPr/>
+              <a:t>7</a:t>
+            </a:fld>
+            <a:endParaRPr lang="en-US"/>
+          </a:p>
+        </p:txBody>
+      </p:sp>
+      <p:sp>
+        <p:nvSpPr>
+          <p:cNvPr id="22532" name="Rectangle 2"/>
+          <p:cNvSpPr>
+            <a:spLocks noGrp="1" noChangeArrowheads="1"/>
+          </p:cNvSpPr>
+          <p:nvPr>
+            <p:ph type="title"/>
+          </p:nvPr>
+        </p:nvSpPr>
+        <p:spPr/>
+        <p:txBody>
+          <a:bodyPr/>
+          <a:lstStyle/>
+          <a:p>
+            <a:r>
+              <a:rPr lang="en-US" sz="3600" dirty="0">
+                <a:ea typeface="ＭＳ Ｐゴシック" charset="-128"/>
+                <a:cs typeface="ＭＳ Ｐゴシック" charset="-128"/>
+              </a:rPr>
+              <a:t>Roadmap</a:t>
+            </a:r>
+          </a:p>
+        </p:txBody>
+      </p:sp>
+      <p:sp>
+        <p:nvSpPr>
+          <p:cNvPr id="22533" name="Rectangle 3"/>
+          <p:cNvSpPr>
+            <a:spLocks noGrp="1" noChangeArrowheads="1"/>
+          </p:cNvSpPr>
+          <p:nvPr>
+            <p:ph type="body" idx="1"/>
+          </p:nvPr>
+        </p:nvSpPr>
+        <p:spPr/>
+        <p:txBody>
+          <a:bodyPr/>
+          <a:lstStyle/>
+          <a:p>
+            <a:r>
+              <a:rPr lang="en-US" dirty="0">
+                <a:ea typeface="ＭＳ Ｐゴシック" charset="-128"/>
+                <a:cs typeface="ＭＳ Ｐゴシック" charset="-128"/>
+              </a:rPr>
+              <a:t>Introduction – Motivation</a:t>
+            </a:r>
+          </a:p>
+          <a:p>
+            <a:r>
+              <a:rPr lang="en-US" dirty="0">
+                <a:ea typeface="ＭＳ Ｐゴシック" charset="-128"/>
+                <a:cs typeface="ＭＳ Ｐゴシック" charset="-128"/>
+              </a:rPr>
+              <a:t>Past</a:t>
+            </a:r>
+          </a:p>
+          <a:p>
+            <a:r>
+              <a:rPr lang="en-US" dirty="0">
+                <a:ea typeface="ＭＳ Ｐゴシック" charset="-128"/>
+                <a:cs typeface="ＭＳ Ｐゴシック" charset="-128"/>
+              </a:rPr>
+              <a:t>Present</a:t>
+            </a:r>
+          </a:p>
+          <a:p>
+            <a:r>
+              <a:rPr lang="en-US" dirty="0">
+                <a:ea typeface="ＭＳ Ｐゴシック" charset="-128"/>
+                <a:cs typeface="ＭＳ Ｐゴシック" charset="-128"/>
+              </a:rPr>
+              <a:t>Future</a:t>
+            </a:r>
+          </a:p>
+          <a:p>
+            <a:pPr lvl="1"/>
+            <a:r>
+              <a:rPr lang="en-US" dirty="0">
+                <a:ea typeface="ＭＳ Ｐゴシック" charset="-128"/>
+                <a:cs typeface="ＭＳ Ｐゴシック" charset="-128"/>
+              </a:rPr>
+              <a:t>Q1) definition?</a:t>
+            </a:r>
+          </a:p>
+          <a:p>
+            <a:pPr lvl="1"/>
+            <a:r>
+              <a:rPr lang="en-US" dirty="0">
+                <a:ea typeface="ＭＳ Ｐゴシック" charset="-128"/>
+                <a:cs typeface="ＭＳ Ｐゴシック" charset="-128"/>
+              </a:rPr>
+              <a:t>Q2) automation?</a:t>
+            </a:r>
+          </a:p>
+          <a:p>
+            <a:pPr lvl="1"/>
+            <a:r>
+              <a:rPr lang="en-US" dirty="0">
+                <a:ea typeface="ＭＳ Ｐゴシック" charset="-128"/>
+                <a:cs typeface="ＭＳ Ｐゴシック" charset="-128"/>
+              </a:rPr>
+              <a:t>Q3) next steps?</a:t>
+            </a:r>
+          </a:p>
+        </p:txBody>
+      </p:sp>
+      <p:sp>
+        <p:nvSpPr>
+          <p:cNvPr id="22534" name="AutoShape 4"/>
+          <p:cNvSpPr>
+            <a:spLocks noChangeArrowheads="1"/>
+          </p:cNvSpPr>
+          <p:nvPr/>
+        </p:nvSpPr>
+        <p:spPr bwMode="auto">
+          <a:xfrm>
+            <a:off x="307975" y="4480037"/>
+            <a:ext cx="377825" cy="290513"/>
+          </a:xfrm>
+          <a:prstGeom prst="rightArrow">
+            <a:avLst>
+              <a:gd name="adj1" fmla="val 50000"/>
+              <a:gd name="adj2" fmla="val 32514"/>
+            </a:avLst>
+          </a:prstGeom>
+          <a:solidFill>
+            <a:schemeClr val="tx2"/>
+          </a:solidFill>
+          <a:ln w="28575">
+            <a:solidFill>
+              <a:schemeClr val="tx2"/>
+            </a:solidFill>
+            <a:miter lim="800000"/>
+            <a:headEnd type="none" w="sm" len="sm"/>
+            <a:tailEnd/>
+          </a:ln>
+        </p:spPr>
+        <p:txBody>
+          <a:bodyPr wrap="none" anchor="ctr">
+            <a:prstTxWarp prst="textNoShape">
+              <a:avLst/>
+            </a:prstTxWarp>
+          </a:bodyPr>
+          <a:lstStyle/>
+          <a:p>
+            <a:endParaRPr lang="en-US"/>
+          </a:p>
+        </p:txBody>
+      </p:sp>
+      <p:sp>
+        <p:nvSpPr>
+          <p:cNvPr id="22535" name="Date Placeholder 7"/>
+          <p:cNvSpPr>
+            <a:spLocks noGrp="1"/>
+          </p:cNvSpPr>
+          <p:nvPr>
+            <p:ph type="dt" sz="quarter" idx="10"/>
+          </p:nvPr>
+        </p:nvSpPr>
+        <p:spPr>
+          <a:noFill/>
+        </p:spPr>
+        <p:txBody>
+          <a:bodyPr/>
+          <a:lstStyle/>
+          <a:p>
+            <a:r>
+              <a:rPr lang="en-US"/>
+              <a:t>PAKDD 2021</a:t>
+            </a:r>
+          </a:p>
+        </p:txBody>
+      </p:sp>
+      <p:pic>
+        <p:nvPicPr>
+          <p:cNvPr id="8" name="Picture 7" descr="energygen-roads.jpg"/>
+          <p:cNvPicPr>
+            <a:picLocks noChangeAspect="1"/>
+          </p:cNvPicPr>
+          <p:nvPr/>
+        </p:nvPicPr>
+        <p:blipFill>
+          <a:blip r:embed="rId3" cstate="screen">
             <a:extLst>
-              <a:ext uri="{FF2B5EF4-FFF2-40B4-BE49-F238E27FC236}">
-                <a16:creationId xmlns:a16="http://schemas.microsoft.com/office/drawing/2014/main" id="{73B7C5C5-1DB8-F74C-B24F-5BD97BE15399}"/>
+              <a:ext uri="{28A0092B-C50C-407E-A947-70E740481C1C}">
+                <a14:useLocalDpi xmlns:a14="http://schemas.microsoft.com/office/drawing/2010/main"/>
               </a:ext>
             </a:extLst>
-          </p:cNvPr>
-          <p:cNvSpPr>
-            <a:spLocks noGrp="1"/>
-          </p:cNvSpPr>
-          <p:nvPr>
-            <p:ph type="title"/>
-          </p:nvPr>
-        </p:nvSpPr>
-        <p:spPr/>
-        <p:txBody>
-          <a:bodyPr/>
-          <a:lstStyle/>
-          <a:p>
-            <a:endParaRPr lang="en-US"/>
-          </a:p>
-        </p:txBody>
-      </p:sp>
-      <p:pic>
-        <p:nvPicPr>
-          <p:cNvPr id="8" name="Content Placeholder 7" descr="Text&#10;&#10;Description automatically generated">
-            <a:extLst>
-              <a:ext uri="{FF2B5EF4-FFF2-40B4-BE49-F238E27FC236}">
-                <a16:creationId xmlns:a16="http://schemas.microsoft.com/office/drawing/2014/main" id="{5225C6C2-2195-C048-A777-D0024756A0B1}"/>
-              </a:ext>
-            </a:extLst>
-          </p:cNvPr>
-          <p:cNvPicPr>
-            <a:picLocks noGrp="1" noChangeAspect="1"/>
-          </p:cNvPicPr>
-          <p:nvPr>
-            <p:ph idx="1"/>
-          </p:nvPr>
-        </p:nvPicPr>
-        <p:blipFill>
-          <a:blip r:embed="rId2"/>
+          </a:blip>
+          <a:srcRect/>
           <a:stretch>
             <a:fillRect/>
           </a:stretch>
         </p:blipFill>
-        <p:spPr>
+        <p:spPr bwMode="auto">
           <a:xfrm>
-            <a:off x="825500" y="2749550"/>
-            <a:ext cx="7493000" cy="2044700"/>
+            <a:off x="6267450" y="1371600"/>
+            <a:ext cx="2457450" cy="1212850"/>
           </a:xfrm>
+          <a:prstGeom prst="rect">
+            <a:avLst/>
+          </a:prstGeom>
+          <a:noFill/>
+          <a:ln w="9525">
+            <a:noFill/>
+            <a:miter lim="800000"/>
+            <a:headEnd/>
+            <a:tailEnd/>
+          </a:ln>
         </p:spPr>
       </p:pic>
-      <p:sp>
-        <p:nvSpPr>
-          <p:cNvPr id="4" name="Date Placeholder 3">
-            <a:extLst>
-              <a:ext uri="{FF2B5EF4-FFF2-40B4-BE49-F238E27FC236}">
-                <a16:creationId xmlns:a16="http://schemas.microsoft.com/office/drawing/2014/main" id="{86D77B73-DE0B-CE4C-B495-E89EFCE54422}"/>
-              </a:ext>
-            </a:extLst>
-          </p:cNvPr>
-          <p:cNvSpPr>
-            <a:spLocks noGrp="1"/>
-          </p:cNvSpPr>
-          <p:nvPr>
-            <p:ph type="dt" sz="half" idx="10"/>
-          </p:nvPr>
-        </p:nvSpPr>
-        <p:spPr/>
-        <p:txBody>
-          <a:bodyPr/>
-          <a:lstStyle/>
-          <a:p>
-            <a:pPr>
-              <a:defRPr/>
-            </a:pPr>
-            <a:r>
-              <a:rPr lang="en-US"/>
-              <a:t>PAKDD 2021</a:t>
-            </a:r>
-          </a:p>
-        </p:txBody>
-      </p:sp>
-      <p:sp>
-        <p:nvSpPr>
-          <p:cNvPr id="5" name="Footer Placeholder 4">
-            <a:extLst>
-              <a:ext uri="{FF2B5EF4-FFF2-40B4-BE49-F238E27FC236}">
-                <a16:creationId xmlns:a16="http://schemas.microsoft.com/office/drawing/2014/main" id="{99BBAF31-59DE-B24B-A8EB-85E50ECF0F96}"/>
-              </a:ext>
-            </a:extLst>
-          </p:cNvPr>
-          <p:cNvSpPr>
-            <a:spLocks noGrp="1"/>
-          </p:cNvSpPr>
-          <p:nvPr>
-            <p:ph type="ftr" sz="quarter" idx="11"/>
-          </p:nvPr>
-        </p:nvSpPr>
-        <p:spPr/>
-        <p:txBody>
-          <a:bodyPr/>
-          <a:lstStyle/>
-          <a:p>
-            <a:pPr>
-              <a:defRPr/>
-            </a:pPr>
-            <a:r>
-              <a:rPr lang="fi-FI"/>
-              <a:t>L. Akoglu, M. McGlohon, C. Faloutsos</a:t>
-            </a:r>
-            <a:endParaRPr lang="en-US"/>
-          </a:p>
-        </p:txBody>
-      </p:sp>
-      <p:sp>
-        <p:nvSpPr>
-          <p:cNvPr id="6" name="Slide Number Placeholder 5">
-            <a:extLst>
-              <a:ext uri="{FF2B5EF4-FFF2-40B4-BE49-F238E27FC236}">
-                <a16:creationId xmlns:a16="http://schemas.microsoft.com/office/drawing/2014/main" id="{FFF1C959-FDC1-964E-A40E-B9241F8C8C86}"/>
-              </a:ext>
-            </a:extLst>
-          </p:cNvPr>
-          <p:cNvSpPr>
-            <a:spLocks noGrp="1"/>
-          </p:cNvSpPr>
-          <p:nvPr>
-            <p:ph type="sldNum" sz="quarter" idx="12"/>
-          </p:nvPr>
-        </p:nvSpPr>
-        <p:spPr/>
-        <p:txBody>
-          <a:bodyPr/>
-          <a:lstStyle/>
-          <a:p>
-            <a:pPr>
-              <a:defRPr/>
-            </a:pPr>
-            <a:fld id="{F9B43987-7F84-BB4A-8611-CDF75B6A737D}" type="slidenum">
-              <a:rPr lang="en-US" smtClean="0"/>
-              <a:pPr>
-                <a:defRPr/>
-              </a:pPr>
-              <a:t>7</a:t>
-            </a:fld>
-            <a:endParaRPr lang="en-US"/>
-          </a:p>
-        </p:txBody>
-      </p:sp>
     </p:spTree>
     <p:extLst>
       <p:ext uri="{BB962C8B-B14F-4D97-AF65-F5344CB8AC3E}">
-        <p14:creationId xmlns:p14="http://schemas.microsoft.com/office/powerpoint/2010/main" val="434287321"/>
+        <p14:creationId xmlns:p14="http://schemas.microsoft.com/office/powerpoint/2010/main" val="3222073294"/>
       </p:ext>
     </p:extLst>
   </p:cSld>
@@ -11942,7 +11799,7 @@
           <p:cNvPr id="2" name="Title 1">
             <a:extLst>
               <a:ext uri="{FF2B5EF4-FFF2-40B4-BE49-F238E27FC236}">
-                <a16:creationId xmlns:a16="http://schemas.microsoft.com/office/drawing/2014/main" id="{C8B244A8-199A-3549-A4F9-C1D2EBFB42FD}"/>
+                <a16:creationId xmlns:a16="http://schemas.microsoft.com/office/drawing/2014/main" id="{73B7C5C5-1DB8-F74C-B24F-5BD97BE15399}"/>
               </a:ext>
             </a:extLst>
           </p:cNvPr>
@@ -11958,16 +11815,19 @@
           <a:bodyPr/>
           <a:lstStyle/>
           <a:p>
-            <a:endParaRPr lang="en-US"/>
+            <a:r>
+              <a:rPr lang="en-US" dirty="0"/>
+              <a:t>Q2) automation?</a:t>
+            </a:r>
           </a:p>
         </p:txBody>
       </p:sp>
       <p:pic>
         <p:nvPicPr>
-          <p:cNvPr id="8" name="Content Placeholder 7" descr="Chart&#10;&#10;Description automatically generated with medium confidence">
+          <p:cNvPr id="8" name="Content Placeholder 7" descr="Text&#10;&#10;Description automatically generated">
             <a:extLst>
               <a:ext uri="{FF2B5EF4-FFF2-40B4-BE49-F238E27FC236}">
-                <a16:creationId xmlns:a16="http://schemas.microsoft.com/office/drawing/2014/main" id="{6BC27F11-3F73-4D41-8D35-36943EF56758}"/>
+                <a16:creationId xmlns:a16="http://schemas.microsoft.com/office/drawing/2014/main" id="{5225C6C2-2195-C048-A777-D0024756A0B1}"/>
               </a:ext>
             </a:extLst>
           </p:cNvPr>
@@ -11986,8 +11846,8 @@
         </p:blipFill>
         <p:spPr>
           <a:xfrm>
-            <a:off x="939800" y="2768600"/>
-            <a:ext cx="7264400" cy="2006600"/>
+            <a:off x="825500" y="2749550"/>
+            <a:ext cx="7493000" cy="2044700"/>
           </a:xfrm>
         </p:spPr>
       </p:pic>
@@ -11996,7 +11856,7 @@
           <p:cNvPr id="4" name="Date Placeholder 3">
             <a:extLst>
               <a:ext uri="{FF2B5EF4-FFF2-40B4-BE49-F238E27FC236}">
-                <a16:creationId xmlns:a16="http://schemas.microsoft.com/office/drawing/2014/main" id="{5EFA08A9-06B6-8547-A9A2-10B24806F635}"/>
+                <a16:creationId xmlns:a16="http://schemas.microsoft.com/office/drawing/2014/main" id="{86D77B73-DE0B-CE4C-B495-E89EFCE54422}"/>
               </a:ext>
             </a:extLst>
           </p:cNvPr>
@@ -12027,7 +11887,7 @@
           <p:cNvPr id="5" name="Footer Placeholder 4">
             <a:extLst>
               <a:ext uri="{FF2B5EF4-FFF2-40B4-BE49-F238E27FC236}">
-                <a16:creationId xmlns:a16="http://schemas.microsoft.com/office/drawing/2014/main" id="{66FD98B2-EDCA-BE4E-8565-93AE8D15716C}"/>
+                <a16:creationId xmlns:a16="http://schemas.microsoft.com/office/drawing/2014/main" id="{99BBAF31-59DE-B24B-A8EB-85E50ECF0F96}"/>
               </a:ext>
             </a:extLst>
           </p:cNvPr>
@@ -12059,7 +11919,7 @@
           <p:cNvPr id="6" name="Slide Number Placeholder 5">
             <a:extLst>
               <a:ext uri="{FF2B5EF4-FFF2-40B4-BE49-F238E27FC236}">
-                <a16:creationId xmlns:a16="http://schemas.microsoft.com/office/drawing/2014/main" id="{26E2CBF9-A6F2-2547-A0DD-41936837FC1C}"/>
+                <a16:creationId xmlns:a16="http://schemas.microsoft.com/office/drawing/2014/main" id="{FFF1C959-FDC1-964E-A40E-B9241F8C8C86}"/>
               </a:ext>
             </a:extLst>
           </p:cNvPr>
@@ -12092,7 +11952,7 @@
     </p:spTree>
     <p:extLst>
       <p:ext uri="{BB962C8B-B14F-4D97-AF65-F5344CB8AC3E}">
-        <p14:creationId xmlns:p14="http://schemas.microsoft.com/office/powerpoint/2010/main" val="1983870279"/>
+        <p14:creationId xmlns:p14="http://schemas.microsoft.com/office/powerpoint/2010/main" val="434287321"/>
       </p:ext>
     </p:extLst>
   </p:cSld>
@@ -12125,7 +11985,7 @@
           <p:cNvPr id="2" name="Title 1">
             <a:extLst>
               <a:ext uri="{FF2B5EF4-FFF2-40B4-BE49-F238E27FC236}">
-                <a16:creationId xmlns:a16="http://schemas.microsoft.com/office/drawing/2014/main" id="{5D7DDBE1-1E7A-E24F-AB5E-8960C93510EE}"/>
+                <a16:creationId xmlns:a16="http://schemas.microsoft.com/office/drawing/2014/main" id="{C8B244A8-199A-3549-A4F9-C1D2EBFB42FD}"/>
               </a:ext>
             </a:extLst>
           </p:cNvPr>
@@ -12147,10 +12007,10 @@
       </p:sp>
       <p:pic>
         <p:nvPicPr>
-          <p:cNvPr id="8" name="Content Placeholder 7" descr="Graphical user interface, application&#10;&#10;Description automatically generated">
+          <p:cNvPr id="8" name="Content Placeholder 7" descr="Chart&#10;&#10;Description automatically generated with medium confidence">
             <a:extLst>
               <a:ext uri="{FF2B5EF4-FFF2-40B4-BE49-F238E27FC236}">
-                <a16:creationId xmlns:a16="http://schemas.microsoft.com/office/drawing/2014/main" id="{2868651C-064D-CE40-A67A-52A8E24D28E9}"/>
+                <a16:creationId xmlns:a16="http://schemas.microsoft.com/office/drawing/2014/main" id="{6BC27F11-3F73-4D41-8D35-36943EF56758}"/>
               </a:ext>
             </a:extLst>
           </p:cNvPr>
@@ -12169,8 +12029,8 @@
         </p:blipFill>
         <p:spPr>
           <a:xfrm>
-            <a:off x="1250950" y="2813050"/>
-            <a:ext cx="6642100" cy="1917700"/>
+            <a:off x="-133531" y="2129220"/>
+            <a:ext cx="9411062" cy="2599559"/>
           </a:xfrm>
         </p:spPr>
       </p:pic>
@@ -12179,7 +12039,7 @@
           <p:cNvPr id="4" name="Date Placeholder 3">
             <a:extLst>
               <a:ext uri="{FF2B5EF4-FFF2-40B4-BE49-F238E27FC236}">
-                <a16:creationId xmlns:a16="http://schemas.microsoft.com/office/drawing/2014/main" id="{466486AD-A7A7-6241-8809-8974D84F31D2}"/>
+                <a16:creationId xmlns:a16="http://schemas.microsoft.com/office/drawing/2014/main" id="{5EFA08A9-06B6-8547-A9A2-10B24806F635}"/>
               </a:ext>
             </a:extLst>
           </p:cNvPr>
@@ -12210,7 +12070,7 @@
           <p:cNvPr id="5" name="Footer Placeholder 4">
             <a:extLst>
               <a:ext uri="{FF2B5EF4-FFF2-40B4-BE49-F238E27FC236}">
-                <a16:creationId xmlns:a16="http://schemas.microsoft.com/office/drawing/2014/main" id="{F398E5F7-3D25-CD47-80BD-A864D9A73436}"/>
+                <a16:creationId xmlns:a16="http://schemas.microsoft.com/office/drawing/2014/main" id="{66FD98B2-EDCA-BE4E-8565-93AE8D15716C}"/>
               </a:ext>
             </a:extLst>
           </p:cNvPr>
@@ -12242,7 +12102,7 @@
           <p:cNvPr id="6" name="Slide Number Placeholder 5">
             <a:extLst>
               <a:ext uri="{FF2B5EF4-FFF2-40B4-BE49-F238E27FC236}">
-                <a16:creationId xmlns:a16="http://schemas.microsoft.com/office/drawing/2014/main" id="{64514D71-7FD5-3F4D-AB73-1E2A43CF4716}"/>
+                <a16:creationId xmlns:a16="http://schemas.microsoft.com/office/drawing/2014/main" id="{26E2CBF9-A6F2-2547-A0DD-41936837FC1C}"/>
               </a:ext>
             </a:extLst>
           </p:cNvPr>
@@ -12275,7 +12135,7 @@
     </p:spTree>
     <p:extLst>
       <p:ext uri="{BB962C8B-B14F-4D97-AF65-F5344CB8AC3E}">
-        <p14:creationId xmlns:p14="http://schemas.microsoft.com/office/powerpoint/2010/main" val="743589915"/>
+        <p14:creationId xmlns:p14="http://schemas.microsoft.com/office/powerpoint/2010/main" val="1983870279"/>
       </p:ext>
     </p:extLst>
   </p:cSld>

</xml_diff>